<commit_message>
Finished Replication with doc
</commit_message>
<xml_diff>
--- a/Replizierung Papers.pptx
+++ b/Replizierung Papers.pptx
@@ -6,6 +6,11 @@
   </p:sldMasterIdLst>
   <p:sldIdLst>
     <p:sldId id="256" r:id="rId2"/>
+    <p:sldId id="258" r:id="rId3"/>
+    <p:sldId id="260" r:id="rId4"/>
+    <p:sldId id="262" r:id="rId5"/>
+    <p:sldId id="261" r:id="rId6"/>
+    <p:sldId id="263" r:id="rId7"/>
   </p:sldIdLst>
   <p:sldSz cx="12192000" cy="6858000"/>
   <p:notesSz cx="6858000" cy="9144000"/>
@@ -104,7 +109,2103 @@
       </a:defRPr>
     </a:lvl9pPr>
   </p:defaultTextStyle>
+  <p:extLst>
+    <p:ext uri="{EFAFB233-063F-42B5-8137-9DF3F51BA10A}">
+      <p15:sldGuideLst xmlns:p15="http://schemas.microsoft.com/office/powerpoint/2012/main"/>
+    </p:ext>
+  </p:extLst>
 </p:presentation>
+</file>
+
+<file path=ppt/charts/chart1.xml><?xml version="1.0" encoding="utf-8"?>
+<c:chartSpace xmlns:c="http://schemas.openxmlformats.org/drawingml/2006/chart" xmlns:a="http://schemas.openxmlformats.org/drawingml/2006/main" xmlns:r="http://schemas.openxmlformats.org/officeDocument/2006/relationships" xmlns:c16r2="http://schemas.microsoft.com/office/drawing/2015/06/chart">
+  <c:date1904 val="0"/>
+  <c:lang val="de-DE"/>
+  <c:roundedCorners val="0"/>
+  <mc:AlternateContent xmlns:mc="http://schemas.openxmlformats.org/markup-compatibility/2006">
+    <mc:Choice xmlns:c14="http://schemas.microsoft.com/office/drawing/2007/8/2/chart" Requires="c14">
+      <c14:style val="102"/>
+    </mc:Choice>
+    <mc:Fallback>
+      <c:style val="2"/>
+    </mc:Fallback>
+  </mc:AlternateContent>
+  <c:chart>
+    <c:autoTitleDeleted val="1"/>
+    <c:plotArea>
+      <c:layout>
+        <c:manualLayout>
+          <c:layoutTarget val="inner"/>
+          <c:xMode val="edge"/>
+          <c:yMode val="edge"/>
+          <c:x val="9.6201206045215287E-2"/>
+          <c:y val="0.13024734175030339"/>
+          <c:w val="0.86995507548560791"/>
+          <c:h val="0.5114769891578288"/>
+        </c:manualLayout>
+      </c:layout>
+      <c:barChart>
+        <c:barDir val="col"/>
+        <c:grouping val="clustered"/>
+        <c:varyColors val="0"/>
+        <c:ser>
+          <c:idx val="0"/>
+          <c:order val="0"/>
+          <c:tx>
+            <c:strRef>
+              <c:f>Tabelle1!$B$1</c:f>
+              <c:strCache>
+                <c:ptCount val="1"/>
+                <c:pt idx="0">
+                  <c:v>Folds</c:v>
+                </c:pt>
+              </c:strCache>
+            </c:strRef>
+          </c:tx>
+          <c:spPr>
+            <a:solidFill>
+              <a:schemeClr val="accent1">
+                <a:lumMod val="40000"/>
+                <a:lumOff val="60000"/>
+              </a:schemeClr>
+            </a:solidFill>
+            <a:ln>
+              <a:noFill/>
+            </a:ln>
+            <a:effectLst>
+              <a:outerShdw blurRad="57150" dist="19050" dir="5400000" algn="ctr" rotWithShape="0">
+                <a:srgbClr val="000000">
+                  <a:alpha val="63000"/>
+                </a:srgbClr>
+              </a:outerShdw>
+            </a:effectLst>
+          </c:spPr>
+          <c:invertIfNegative val="0"/>
+          <c:dLbls>
+            <c:dLbl>
+              <c:idx val="3"/>
+              <c:tx>
+                <c:rich>
+                  <a:bodyPr/>
+                  <a:lstStyle/>
+                  <a:p>
+                    <a:fld id="{0478ECC0-105E-450B-A5F0-1D58A17102E5}" type="VALUE">
+                      <a:rPr lang="en-US">
+                        <a:solidFill>
+                          <a:schemeClr val="tx1"/>
+                        </a:solidFill>
+                      </a:rPr>
+                      <a:pPr/>
+                      <a:t>[WERT]</a:t>
+                    </a:fld>
+                    <a:endParaRPr lang="de-DE"/>
+                  </a:p>
+                </c:rich>
+              </c:tx>
+              <c:dLblPos val="ctr"/>
+              <c:showLegendKey val="0"/>
+              <c:showVal val="1"/>
+              <c:showCatName val="0"/>
+              <c:showSerName val="0"/>
+              <c:showPercent val="0"/>
+              <c:showBubbleSize val="0"/>
+              <c:extLst>
+                <c:ext xmlns:c15="http://schemas.microsoft.com/office/drawing/2012/chart" uri="{CE6537A1-D6FC-4f65-9D91-7224C49458BB}">
+                  <c15:dlblFieldTable/>
+                  <c15:showDataLabelsRange val="0"/>
+                </c:ext>
+                <c:ext xmlns:c16="http://schemas.microsoft.com/office/drawing/2014/chart" uri="{C3380CC4-5D6E-409C-BE32-E72D297353CC}">
+                  <c16:uniqueId val="{00000003-463C-4B8B-9794-1CC005468DBF}"/>
+                </c:ext>
+              </c:extLst>
+            </c:dLbl>
+            <c:spPr>
+              <a:noFill/>
+              <a:ln>
+                <a:noFill/>
+              </a:ln>
+              <a:effectLst/>
+            </c:spPr>
+            <c:txPr>
+              <a:bodyPr rot="0" spcFirstLastPara="1" vertOverflow="ellipsis" vert="horz" wrap="square" lIns="38100" tIns="19050" rIns="38100" bIns="19050" anchor="ctr" anchorCtr="1">
+                <a:spAutoFit/>
+              </a:bodyPr>
+              <a:lstStyle/>
+              <a:p>
+                <a:pPr>
+                  <a:defRPr sz="1197" b="0" i="0" u="none" strike="noStrike" kern="1200" baseline="0">
+                    <a:solidFill>
+                      <a:schemeClr val="tx1">
+                        <a:lumMod val="75000"/>
+                        <a:lumOff val="25000"/>
+                      </a:schemeClr>
+                    </a:solidFill>
+                    <a:latin typeface="+mn-lt"/>
+                    <a:ea typeface="+mn-ea"/>
+                    <a:cs typeface="+mn-cs"/>
+                  </a:defRPr>
+                </a:pPr>
+                <a:endParaRPr lang="de-DE"/>
+              </a:p>
+            </c:txPr>
+            <c:dLblPos val="ctr"/>
+            <c:showLegendKey val="0"/>
+            <c:showVal val="1"/>
+            <c:showCatName val="0"/>
+            <c:showSerName val="0"/>
+            <c:showPercent val="0"/>
+            <c:showBubbleSize val="0"/>
+            <c:showLeaderLines val="0"/>
+            <c:extLst>
+              <c:ext xmlns:c15="http://schemas.microsoft.com/office/drawing/2012/chart" uri="{CE6537A1-D6FC-4f65-9D91-7224C49458BB}">
+                <c15:showLeaderLines val="1"/>
+                <c15:leaderLines>
+                  <c:spPr>
+                    <a:ln w="9525" cap="flat" cmpd="sng" algn="ctr">
+                      <a:solidFill>
+                        <a:schemeClr val="tx1">
+                          <a:lumMod val="35000"/>
+                          <a:lumOff val="65000"/>
+                        </a:schemeClr>
+                      </a:solidFill>
+                      <a:round/>
+                    </a:ln>
+                    <a:effectLst/>
+                  </c:spPr>
+                </c15:leaderLines>
+              </c:ext>
+            </c:extLst>
+          </c:dLbls>
+          <c:cat>
+            <c:numRef>
+              <c:f>Tabelle1!$A$2:$A$11</c:f>
+              <c:numCache>
+                <c:formatCode>General</c:formatCode>
+                <c:ptCount val="10"/>
+                <c:pt idx="0">
+                  <c:v>1</c:v>
+                </c:pt>
+                <c:pt idx="1">
+                  <c:v>2</c:v>
+                </c:pt>
+                <c:pt idx="2">
+                  <c:v>3</c:v>
+                </c:pt>
+                <c:pt idx="3">
+                  <c:v>4</c:v>
+                </c:pt>
+                <c:pt idx="4">
+                  <c:v>5</c:v>
+                </c:pt>
+                <c:pt idx="5">
+                  <c:v>6</c:v>
+                </c:pt>
+                <c:pt idx="6">
+                  <c:v>7</c:v>
+                </c:pt>
+                <c:pt idx="7">
+                  <c:v>8</c:v>
+                </c:pt>
+                <c:pt idx="8">
+                  <c:v>9</c:v>
+                </c:pt>
+                <c:pt idx="9">
+                  <c:v>10</c:v>
+                </c:pt>
+              </c:numCache>
+            </c:numRef>
+          </c:cat>
+          <c:val>
+            <c:numRef>
+              <c:f>Tabelle1!$B$2:$B$11</c:f>
+              <c:numCache>
+                <c:formatCode>0%</c:formatCode>
+                <c:ptCount val="10"/>
+                <c:pt idx="0">
+                  <c:v>0</c:v>
+                </c:pt>
+                <c:pt idx="1">
+                  <c:v>0</c:v>
+                </c:pt>
+                <c:pt idx="2">
+                  <c:v>0</c:v>
+                </c:pt>
+                <c:pt idx="3" formatCode="0.00%">
+                  <c:v>0.28539999999999999</c:v>
+                </c:pt>
+                <c:pt idx="4" formatCode="0.00%">
+                  <c:v>0.17530000000000001</c:v>
+                </c:pt>
+                <c:pt idx="5" formatCode="0.00%">
+                  <c:v>0.21590000000000001</c:v>
+                </c:pt>
+                <c:pt idx="6" formatCode="0.00%">
+                  <c:v>0.13650000000000001</c:v>
+                </c:pt>
+                <c:pt idx="7" formatCode="0.00%">
+                  <c:v>0.10100000000000001</c:v>
+                </c:pt>
+                <c:pt idx="8" formatCode="0.00%">
+                  <c:v>5.04E-2</c:v>
+                </c:pt>
+                <c:pt idx="9" formatCode="0.00%">
+                  <c:v>3.5900000000000001E-2</c:v>
+                </c:pt>
+              </c:numCache>
+            </c:numRef>
+          </c:val>
+          <c:extLst>
+            <c:ext xmlns:c16="http://schemas.microsoft.com/office/drawing/2014/chart" uri="{C3380CC4-5D6E-409C-BE32-E72D297353CC}">
+              <c16:uniqueId val="{00000000-463C-4B8B-9794-1CC005468DBF}"/>
+            </c:ext>
+          </c:extLst>
+        </c:ser>
+        <c:dLbls>
+          <c:dLblPos val="ctr"/>
+          <c:showLegendKey val="0"/>
+          <c:showVal val="1"/>
+          <c:showCatName val="0"/>
+          <c:showSerName val="0"/>
+          <c:showPercent val="0"/>
+          <c:showBubbleSize val="0"/>
+        </c:dLbls>
+        <c:gapWidth val="100"/>
+        <c:overlap val="-24"/>
+        <c:axId val="760118687"/>
+        <c:axId val="760120127"/>
+      </c:barChart>
+      <c:catAx>
+        <c:axId val="760118687"/>
+        <c:scaling>
+          <c:orientation val="minMax"/>
+        </c:scaling>
+        <c:delete val="0"/>
+        <c:axPos val="b"/>
+        <c:title>
+          <c:tx>
+            <c:rich>
+              <a:bodyPr rot="0" spcFirstLastPara="1" vertOverflow="ellipsis" vert="horz" wrap="square" anchor="ctr" anchorCtr="1"/>
+              <a:lstStyle/>
+              <a:p>
+                <a:pPr>
+                  <a:defRPr sz="1197" b="0" i="0" u="none" strike="noStrike" kern="1200" baseline="0">
+                    <a:solidFill>
+                      <a:schemeClr val="tx1">
+                        <a:lumMod val="65000"/>
+                        <a:lumOff val="35000"/>
+                      </a:schemeClr>
+                    </a:solidFill>
+                    <a:latin typeface="+mn-lt"/>
+                    <a:ea typeface="+mn-ea"/>
+                    <a:cs typeface="+mn-cs"/>
+                  </a:defRPr>
+                </a:pPr>
+                <a:r>
+                  <a:rPr lang="de-DE" dirty="0" err="1"/>
+                  <a:t>Cancellation</a:t>
+                </a:r>
+                <a:r>
+                  <a:rPr lang="de-DE" dirty="0"/>
+                  <a:t> </a:t>
+                </a:r>
+                <a:r>
+                  <a:rPr lang="de-DE" dirty="0" err="1"/>
+                  <a:t>Fold</a:t>
+                </a:r>
+                <a:endParaRPr lang="de-DE" dirty="0"/>
+              </a:p>
+            </c:rich>
+          </c:tx>
+          <c:overlay val="0"/>
+          <c:spPr>
+            <a:noFill/>
+            <a:ln>
+              <a:noFill/>
+            </a:ln>
+            <a:effectLst/>
+          </c:spPr>
+          <c:txPr>
+            <a:bodyPr rot="0" spcFirstLastPara="1" vertOverflow="ellipsis" vert="horz" wrap="square" anchor="ctr" anchorCtr="1"/>
+            <a:lstStyle/>
+            <a:p>
+              <a:pPr>
+                <a:defRPr sz="1197" b="0" i="0" u="none" strike="noStrike" kern="1200" baseline="0">
+                  <a:solidFill>
+                    <a:schemeClr val="tx1">
+                      <a:lumMod val="65000"/>
+                      <a:lumOff val="35000"/>
+                    </a:schemeClr>
+                  </a:solidFill>
+                  <a:latin typeface="+mn-lt"/>
+                  <a:ea typeface="+mn-ea"/>
+                  <a:cs typeface="+mn-cs"/>
+                </a:defRPr>
+              </a:pPr>
+              <a:endParaRPr lang="de-DE"/>
+            </a:p>
+          </c:txPr>
+        </c:title>
+        <c:numFmt formatCode="General" sourceLinked="1"/>
+        <c:majorTickMark val="none"/>
+        <c:minorTickMark val="none"/>
+        <c:tickLblPos val="nextTo"/>
+        <c:spPr>
+          <a:noFill/>
+          <a:ln w="12700" cap="flat" cmpd="sng" algn="ctr">
+            <a:solidFill>
+              <a:schemeClr val="tx1">
+                <a:lumMod val="15000"/>
+                <a:lumOff val="85000"/>
+              </a:schemeClr>
+            </a:solidFill>
+            <a:round/>
+          </a:ln>
+          <a:effectLst/>
+        </c:spPr>
+        <c:txPr>
+          <a:bodyPr rot="-60000000" spcFirstLastPara="1" vertOverflow="ellipsis" vert="horz" wrap="square" anchor="ctr" anchorCtr="1"/>
+          <a:lstStyle/>
+          <a:p>
+            <a:pPr>
+              <a:defRPr sz="1197" b="0" i="0" u="none" strike="noStrike" kern="1200" baseline="0">
+                <a:solidFill>
+                  <a:schemeClr val="tx1">
+                    <a:lumMod val="65000"/>
+                    <a:lumOff val="35000"/>
+                  </a:schemeClr>
+                </a:solidFill>
+                <a:latin typeface="+mn-lt"/>
+                <a:ea typeface="+mn-ea"/>
+                <a:cs typeface="+mn-cs"/>
+              </a:defRPr>
+            </a:pPr>
+            <a:endParaRPr lang="de-DE"/>
+          </a:p>
+        </c:txPr>
+        <c:crossAx val="760120127"/>
+        <c:crosses val="autoZero"/>
+        <c:auto val="1"/>
+        <c:lblAlgn val="ctr"/>
+        <c:lblOffset val="100"/>
+        <c:noMultiLvlLbl val="0"/>
+      </c:catAx>
+      <c:valAx>
+        <c:axId val="760120127"/>
+        <c:scaling>
+          <c:orientation val="minMax"/>
+        </c:scaling>
+        <c:delete val="1"/>
+        <c:axPos val="l"/>
+        <c:majorGridlines>
+          <c:spPr>
+            <a:ln w="9525" cap="flat" cmpd="sng" algn="ctr">
+              <a:solidFill>
+                <a:schemeClr val="tx1">
+                  <a:lumMod val="15000"/>
+                  <a:lumOff val="85000"/>
+                </a:schemeClr>
+              </a:solidFill>
+              <a:round/>
+            </a:ln>
+            <a:effectLst/>
+          </c:spPr>
+        </c:majorGridlines>
+        <c:title>
+          <c:tx>
+            <c:rich>
+              <a:bodyPr rot="-5400000" spcFirstLastPara="1" vertOverflow="ellipsis" vert="horz" wrap="square" anchor="ctr" anchorCtr="1"/>
+              <a:lstStyle/>
+              <a:p>
+                <a:pPr>
+                  <a:defRPr sz="1197" b="0" i="0" u="none" strike="noStrike" kern="1200" baseline="0">
+                    <a:solidFill>
+                      <a:schemeClr val="tx1">
+                        <a:lumMod val="65000"/>
+                        <a:lumOff val="35000"/>
+                      </a:schemeClr>
+                    </a:solidFill>
+                    <a:latin typeface="+mn-lt"/>
+                    <a:ea typeface="+mn-ea"/>
+                    <a:cs typeface="+mn-cs"/>
+                  </a:defRPr>
+                </a:pPr>
+                <a:r>
+                  <a:rPr lang="de-DE" dirty="0" err="1"/>
+                  <a:t>Frequency</a:t>
+                </a:r>
+                <a:r>
+                  <a:rPr lang="de-DE" dirty="0"/>
+                  <a:t> (%)</a:t>
+                </a:r>
+              </a:p>
+            </c:rich>
+          </c:tx>
+          <c:overlay val="0"/>
+          <c:spPr>
+            <a:noFill/>
+            <a:ln>
+              <a:noFill/>
+            </a:ln>
+            <a:effectLst/>
+          </c:spPr>
+          <c:txPr>
+            <a:bodyPr rot="-5400000" spcFirstLastPara="1" vertOverflow="ellipsis" vert="horz" wrap="square" anchor="ctr" anchorCtr="1"/>
+            <a:lstStyle/>
+            <a:p>
+              <a:pPr>
+                <a:defRPr sz="1197" b="0" i="0" u="none" strike="noStrike" kern="1200" baseline="0">
+                  <a:solidFill>
+                    <a:schemeClr val="tx1">
+                      <a:lumMod val="65000"/>
+                      <a:lumOff val="35000"/>
+                    </a:schemeClr>
+                  </a:solidFill>
+                  <a:latin typeface="+mn-lt"/>
+                  <a:ea typeface="+mn-ea"/>
+                  <a:cs typeface="+mn-cs"/>
+                </a:defRPr>
+              </a:pPr>
+              <a:endParaRPr lang="de-DE"/>
+            </a:p>
+          </c:txPr>
+        </c:title>
+        <c:numFmt formatCode="0%" sourceLinked="1"/>
+        <c:majorTickMark val="none"/>
+        <c:minorTickMark val="none"/>
+        <c:tickLblPos val="nextTo"/>
+        <c:crossAx val="760118687"/>
+        <c:crosses val="autoZero"/>
+        <c:crossBetween val="between"/>
+      </c:valAx>
+      <c:spPr>
+        <a:noFill/>
+        <a:ln>
+          <a:noFill/>
+        </a:ln>
+        <a:effectLst/>
+      </c:spPr>
+    </c:plotArea>
+    <c:plotVisOnly val="1"/>
+    <c:dispBlanksAs val="gap"/>
+    <c:extLst>
+      <c:ext xmlns:c16r3="http://schemas.microsoft.com/office/drawing/2017/03/chart" uri="{56B9EC1D-385E-4148-901F-78D8002777C0}">
+        <c16r3:dataDisplayOptions16>
+          <c16r3:dispNaAsBlank val="1"/>
+        </c16r3:dataDisplayOptions16>
+      </c:ext>
+    </c:extLst>
+    <c:showDLblsOverMax val="0"/>
+  </c:chart>
+  <c:spPr>
+    <a:noFill/>
+    <a:ln>
+      <a:noFill/>
+    </a:ln>
+    <a:effectLst/>
+  </c:spPr>
+  <c:txPr>
+    <a:bodyPr/>
+    <a:lstStyle/>
+    <a:p>
+      <a:pPr>
+        <a:defRPr/>
+      </a:pPr>
+      <a:endParaRPr lang="de-DE"/>
+    </a:p>
+  </c:txPr>
+  <c:externalData r:id="rId3">
+    <c:autoUpdate val="0"/>
+  </c:externalData>
+</c:chartSpace>
+</file>
+
+<file path=ppt/charts/chart2.xml><?xml version="1.0" encoding="utf-8"?>
+<c:chartSpace xmlns:c="http://schemas.openxmlformats.org/drawingml/2006/chart" xmlns:a="http://schemas.openxmlformats.org/drawingml/2006/main" xmlns:r="http://schemas.openxmlformats.org/officeDocument/2006/relationships" xmlns:c16r2="http://schemas.microsoft.com/office/drawing/2015/06/chart">
+  <c:date1904 val="0"/>
+  <c:lang val="de-DE"/>
+  <c:roundedCorners val="0"/>
+  <mc:AlternateContent xmlns:mc="http://schemas.openxmlformats.org/markup-compatibility/2006">
+    <mc:Choice xmlns:c14="http://schemas.microsoft.com/office/drawing/2007/8/2/chart" Requires="c14">
+      <c14:style val="102"/>
+    </mc:Choice>
+    <mc:Fallback>
+      <c:style val="2"/>
+    </mc:Fallback>
+  </mc:AlternateContent>
+  <c:chart>
+    <c:autoTitleDeleted val="1"/>
+    <c:plotArea>
+      <c:layout/>
+      <c:barChart>
+        <c:barDir val="col"/>
+        <c:grouping val="clustered"/>
+        <c:varyColors val="0"/>
+        <c:ser>
+          <c:idx val="0"/>
+          <c:order val="0"/>
+          <c:tx>
+            <c:strRef>
+              <c:f>Tabelle1!$B$1</c:f>
+              <c:strCache>
+                <c:ptCount val="1"/>
+                <c:pt idx="0">
+                  <c:v>Datenreihe 1</c:v>
+                </c:pt>
+              </c:strCache>
+            </c:strRef>
+          </c:tx>
+          <c:spPr>
+            <a:solidFill>
+              <a:schemeClr val="accent1">
+                <a:lumMod val="40000"/>
+                <a:lumOff val="60000"/>
+              </a:schemeClr>
+            </a:solidFill>
+            <a:ln>
+              <a:noFill/>
+            </a:ln>
+            <a:effectLst>
+              <a:outerShdw blurRad="57150" dist="19050" dir="5400000" algn="ctr" rotWithShape="0">
+                <a:srgbClr val="000000">
+                  <a:alpha val="63000"/>
+                </a:srgbClr>
+              </a:outerShdw>
+            </a:effectLst>
+          </c:spPr>
+          <c:invertIfNegative val="0"/>
+          <c:dLbls>
+            <c:dLbl>
+              <c:idx val="2"/>
+              <c:tx>
+                <c:rich>
+                  <a:bodyPr/>
+                  <a:lstStyle/>
+                  <a:p>
+                    <a:fld id="{71E9CE0D-CCA5-4EAD-80FC-10AFFFD374EA}" type="VALUE">
+                      <a:rPr lang="en-US">
+                        <a:solidFill>
+                          <a:schemeClr val="tx1"/>
+                        </a:solidFill>
+                      </a:rPr>
+                      <a:pPr/>
+                      <a:t>[WERT]</a:t>
+                    </a:fld>
+                    <a:endParaRPr lang="de-DE"/>
+                  </a:p>
+                </c:rich>
+              </c:tx>
+              <c:dLblPos val="ctr"/>
+              <c:showLegendKey val="0"/>
+              <c:showVal val="1"/>
+              <c:showCatName val="0"/>
+              <c:showSerName val="0"/>
+              <c:showPercent val="0"/>
+              <c:showBubbleSize val="0"/>
+              <c:extLst>
+                <c:ext xmlns:c15="http://schemas.microsoft.com/office/drawing/2012/chart" uri="{CE6537A1-D6FC-4f65-9D91-7224C49458BB}">
+                  <c15:dlblFieldTable/>
+                  <c15:showDataLabelsRange val="0"/>
+                </c:ext>
+                <c:ext xmlns:c16="http://schemas.microsoft.com/office/drawing/2014/chart" uri="{C3380CC4-5D6E-409C-BE32-E72D297353CC}">
+                  <c16:uniqueId val="{00000003-DAF8-4579-9D7D-2B6C88A0F6AC}"/>
+                </c:ext>
+              </c:extLst>
+            </c:dLbl>
+            <c:spPr>
+              <a:noFill/>
+              <a:ln>
+                <a:noFill/>
+              </a:ln>
+              <a:effectLst/>
+            </c:spPr>
+            <c:txPr>
+              <a:bodyPr rot="0" spcFirstLastPara="1" vertOverflow="ellipsis" vert="horz" wrap="square" lIns="38100" tIns="19050" rIns="38100" bIns="19050" anchor="ctr" anchorCtr="1">
+                <a:spAutoFit/>
+              </a:bodyPr>
+              <a:lstStyle/>
+              <a:p>
+                <a:pPr>
+                  <a:defRPr sz="1197" b="0" i="0" u="none" strike="noStrike" kern="1200" baseline="0">
+                    <a:solidFill>
+                      <a:schemeClr val="tx1">
+                        <a:lumMod val="75000"/>
+                        <a:lumOff val="25000"/>
+                      </a:schemeClr>
+                    </a:solidFill>
+                    <a:latin typeface="+mn-lt"/>
+                    <a:ea typeface="+mn-ea"/>
+                    <a:cs typeface="+mn-cs"/>
+                  </a:defRPr>
+                </a:pPr>
+                <a:endParaRPr lang="de-DE"/>
+              </a:p>
+            </c:txPr>
+            <c:dLblPos val="ctr"/>
+            <c:showLegendKey val="0"/>
+            <c:showVal val="1"/>
+            <c:showCatName val="0"/>
+            <c:showSerName val="0"/>
+            <c:showPercent val="0"/>
+            <c:showBubbleSize val="0"/>
+            <c:showLeaderLines val="0"/>
+            <c:extLst>
+              <c:ext xmlns:c15="http://schemas.microsoft.com/office/drawing/2012/chart" uri="{CE6537A1-D6FC-4f65-9D91-7224C49458BB}">
+                <c15:showLeaderLines val="1"/>
+                <c15:leaderLines>
+                  <c:spPr>
+                    <a:ln w="9525" cap="flat" cmpd="sng" algn="ctr">
+                      <a:solidFill>
+                        <a:schemeClr val="tx1">
+                          <a:lumMod val="35000"/>
+                          <a:lumOff val="65000"/>
+                        </a:schemeClr>
+                      </a:solidFill>
+                      <a:round/>
+                    </a:ln>
+                    <a:effectLst/>
+                  </c:spPr>
+                </c15:leaderLines>
+              </c:ext>
+            </c:extLst>
+          </c:dLbls>
+          <c:cat>
+            <c:numRef>
+              <c:f>Tabelle1!$A$2:$A$10</c:f>
+              <c:numCache>
+                <c:formatCode>General</c:formatCode>
+                <c:ptCount val="9"/>
+                <c:pt idx="0">
+                  <c:v>90</c:v>
+                </c:pt>
+                <c:pt idx="1">
+                  <c:v>91</c:v>
+                </c:pt>
+                <c:pt idx="2">
+                  <c:v>93</c:v>
+                </c:pt>
+                <c:pt idx="3">
+                  <c:v>94</c:v>
+                </c:pt>
+                <c:pt idx="4">
+                  <c:v>95</c:v>
+                </c:pt>
+                <c:pt idx="5">
+                  <c:v>96</c:v>
+                </c:pt>
+                <c:pt idx="6">
+                  <c:v>97</c:v>
+                </c:pt>
+                <c:pt idx="7">
+                  <c:v>98</c:v>
+                </c:pt>
+                <c:pt idx="8">
+                  <c:v>99</c:v>
+                </c:pt>
+              </c:numCache>
+            </c:numRef>
+          </c:cat>
+          <c:val>
+            <c:numRef>
+              <c:f>Tabelle1!$B$2:$B$10</c:f>
+              <c:numCache>
+                <c:formatCode>0.00%</c:formatCode>
+                <c:ptCount val="9"/>
+                <c:pt idx="0">
+                  <c:v>3.3000000000000002E-2</c:v>
+                </c:pt>
+                <c:pt idx="1">
+                  <c:v>3.3000000000000002E-2</c:v>
+                </c:pt>
+                <c:pt idx="2" formatCode="0%">
+                  <c:v>0.1</c:v>
+                </c:pt>
+                <c:pt idx="3">
+                  <c:v>3.3300000000000003E-2</c:v>
+                </c:pt>
+                <c:pt idx="4">
+                  <c:v>0.23330000000000001</c:v>
+                </c:pt>
+                <c:pt idx="5">
+                  <c:v>0.1333</c:v>
+                </c:pt>
+                <c:pt idx="6">
+                  <c:v>0.16669999999999999</c:v>
+                </c:pt>
+                <c:pt idx="7" formatCode="0%">
+                  <c:v>0.1</c:v>
+                </c:pt>
+                <c:pt idx="8">
+                  <c:v>0.16669999999999999</c:v>
+                </c:pt>
+              </c:numCache>
+            </c:numRef>
+          </c:val>
+          <c:extLst>
+            <c:ext xmlns:c16="http://schemas.microsoft.com/office/drawing/2014/chart" uri="{C3380CC4-5D6E-409C-BE32-E72D297353CC}">
+              <c16:uniqueId val="{00000000-DAF8-4579-9D7D-2B6C88A0F6AC}"/>
+            </c:ext>
+          </c:extLst>
+        </c:ser>
+        <c:dLbls>
+          <c:dLblPos val="ctr"/>
+          <c:showLegendKey val="0"/>
+          <c:showVal val="1"/>
+          <c:showCatName val="0"/>
+          <c:showSerName val="0"/>
+          <c:showPercent val="0"/>
+          <c:showBubbleSize val="0"/>
+        </c:dLbls>
+        <c:gapWidth val="100"/>
+        <c:overlap val="-24"/>
+        <c:axId val="1214509119"/>
+        <c:axId val="1214494239"/>
+      </c:barChart>
+      <c:catAx>
+        <c:axId val="1214509119"/>
+        <c:scaling>
+          <c:orientation val="minMax"/>
+        </c:scaling>
+        <c:delete val="0"/>
+        <c:axPos val="b"/>
+        <c:title>
+          <c:tx>
+            <c:rich>
+              <a:bodyPr rot="0" spcFirstLastPara="1" vertOverflow="ellipsis" vert="horz" wrap="square" anchor="ctr" anchorCtr="1"/>
+              <a:lstStyle/>
+              <a:p>
+                <a:pPr>
+                  <a:defRPr sz="1197" b="0" i="0" u="none" strike="noStrike" kern="1200" baseline="0">
+                    <a:solidFill>
+                      <a:schemeClr val="tx1">
+                        <a:lumMod val="65000"/>
+                        <a:lumOff val="35000"/>
+                      </a:schemeClr>
+                    </a:solidFill>
+                    <a:latin typeface="+mn-lt"/>
+                    <a:ea typeface="+mn-ea"/>
+                    <a:cs typeface="+mn-cs"/>
+                  </a:defRPr>
+                </a:pPr>
+                <a:r>
+                  <a:rPr lang="de-DE" dirty="0" err="1"/>
+                  <a:t>Percentages</a:t>
+                </a:r>
+                <a:r>
+                  <a:rPr lang="de-DE" dirty="0"/>
+                  <a:t> </a:t>
+                </a:r>
+                <a:r>
+                  <a:rPr lang="de-DE" dirty="0" err="1"/>
+                  <a:t>within</a:t>
+                </a:r>
+                <a:r>
+                  <a:rPr lang="de-DE" baseline="0" dirty="0"/>
+                  <a:t> </a:t>
+                </a:r>
+                <a:r>
+                  <a:rPr lang="de-DE" baseline="0" dirty="0" err="1"/>
+                  <a:t>confidence</a:t>
+                </a:r>
+                <a:r>
+                  <a:rPr lang="de-DE" baseline="0" dirty="0"/>
+                  <a:t> </a:t>
+                </a:r>
+                <a:r>
+                  <a:rPr lang="de-DE" baseline="0" dirty="0" err="1"/>
+                  <a:t>interval</a:t>
+                </a:r>
+                <a:r>
+                  <a:rPr lang="de-DE" baseline="0" dirty="0"/>
+                  <a:t> (%)</a:t>
+                </a:r>
+              </a:p>
+            </c:rich>
+          </c:tx>
+          <c:overlay val="0"/>
+          <c:spPr>
+            <a:noFill/>
+            <a:ln>
+              <a:noFill/>
+            </a:ln>
+            <a:effectLst/>
+          </c:spPr>
+          <c:txPr>
+            <a:bodyPr rot="0" spcFirstLastPara="1" vertOverflow="ellipsis" vert="horz" wrap="square" anchor="ctr" anchorCtr="1"/>
+            <a:lstStyle/>
+            <a:p>
+              <a:pPr>
+                <a:defRPr sz="1197" b="0" i="0" u="none" strike="noStrike" kern="1200" baseline="0">
+                  <a:solidFill>
+                    <a:schemeClr val="tx1">
+                      <a:lumMod val="65000"/>
+                      <a:lumOff val="35000"/>
+                    </a:schemeClr>
+                  </a:solidFill>
+                  <a:latin typeface="+mn-lt"/>
+                  <a:ea typeface="+mn-ea"/>
+                  <a:cs typeface="+mn-cs"/>
+                </a:defRPr>
+              </a:pPr>
+              <a:endParaRPr lang="de-DE"/>
+            </a:p>
+          </c:txPr>
+        </c:title>
+        <c:numFmt formatCode="General" sourceLinked="1"/>
+        <c:majorTickMark val="none"/>
+        <c:minorTickMark val="none"/>
+        <c:tickLblPos val="nextTo"/>
+        <c:spPr>
+          <a:noFill/>
+          <a:ln w="12700" cap="flat" cmpd="sng" algn="ctr">
+            <a:solidFill>
+              <a:schemeClr val="tx1">
+                <a:lumMod val="15000"/>
+                <a:lumOff val="85000"/>
+              </a:schemeClr>
+            </a:solidFill>
+            <a:round/>
+          </a:ln>
+          <a:effectLst/>
+        </c:spPr>
+        <c:txPr>
+          <a:bodyPr rot="-60000000" spcFirstLastPara="1" vertOverflow="ellipsis" vert="horz" wrap="square" anchor="ctr" anchorCtr="1"/>
+          <a:lstStyle/>
+          <a:p>
+            <a:pPr>
+              <a:defRPr sz="1197" b="0" i="0" u="none" strike="noStrike" kern="1200" baseline="0">
+                <a:solidFill>
+                  <a:schemeClr val="tx1">
+                    <a:lumMod val="65000"/>
+                    <a:lumOff val="35000"/>
+                  </a:schemeClr>
+                </a:solidFill>
+                <a:latin typeface="+mn-lt"/>
+                <a:ea typeface="+mn-ea"/>
+                <a:cs typeface="+mn-cs"/>
+              </a:defRPr>
+            </a:pPr>
+            <a:endParaRPr lang="de-DE"/>
+          </a:p>
+        </c:txPr>
+        <c:crossAx val="1214494239"/>
+        <c:crosses val="autoZero"/>
+        <c:auto val="1"/>
+        <c:lblAlgn val="ctr"/>
+        <c:lblOffset val="100"/>
+        <c:noMultiLvlLbl val="0"/>
+      </c:catAx>
+      <c:valAx>
+        <c:axId val="1214494239"/>
+        <c:scaling>
+          <c:orientation val="minMax"/>
+        </c:scaling>
+        <c:delete val="1"/>
+        <c:axPos val="l"/>
+        <c:majorGridlines>
+          <c:spPr>
+            <a:ln w="9525" cap="flat" cmpd="sng" algn="ctr">
+              <a:solidFill>
+                <a:schemeClr val="tx1">
+                  <a:lumMod val="15000"/>
+                  <a:lumOff val="85000"/>
+                </a:schemeClr>
+              </a:solidFill>
+              <a:round/>
+            </a:ln>
+            <a:effectLst/>
+          </c:spPr>
+        </c:majorGridlines>
+        <c:title>
+          <c:tx>
+            <c:rich>
+              <a:bodyPr rot="-5400000" spcFirstLastPara="1" vertOverflow="ellipsis" vert="horz" wrap="square" anchor="ctr" anchorCtr="1"/>
+              <a:lstStyle/>
+              <a:p>
+                <a:pPr>
+                  <a:defRPr sz="1197" b="0" i="0" u="none" strike="noStrike" kern="1200" baseline="0">
+                    <a:solidFill>
+                      <a:schemeClr val="tx1">
+                        <a:lumMod val="65000"/>
+                        <a:lumOff val="35000"/>
+                      </a:schemeClr>
+                    </a:solidFill>
+                    <a:latin typeface="+mn-lt"/>
+                    <a:ea typeface="+mn-ea"/>
+                    <a:cs typeface="+mn-cs"/>
+                  </a:defRPr>
+                </a:pPr>
+                <a:r>
+                  <a:rPr lang="de-DE" dirty="0" err="1"/>
+                  <a:t>Frequency</a:t>
+                </a:r>
+                <a:r>
+                  <a:rPr lang="de-DE" dirty="0"/>
+                  <a:t> (%)</a:t>
+                </a:r>
+              </a:p>
+            </c:rich>
+          </c:tx>
+          <c:overlay val="0"/>
+          <c:spPr>
+            <a:noFill/>
+            <a:ln>
+              <a:noFill/>
+            </a:ln>
+            <a:effectLst/>
+          </c:spPr>
+          <c:txPr>
+            <a:bodyPr rot="-5400000" spcFirstLastPara="1" vertOverflow="ellipsis" vert="horz" wrap="square" anchor="ctr" anchorCtr="1"/>
+            <a:lstStyle/>
+            <a:p>
+              <a:pPr>
+                <a:defRPr sz="1197" b="0" i="0" u="none" strike="noStrike" kern="1200" baseline="0">
+                  <a:solidFill>
+                    <a:schemeClr val="tx1">
+                      <a:lumMod val="65000"/>
+                      <a:lumOff val="35000"/>
+                    </a:schemeClr>
+                  </a:solidFill>
+                  <a:latin typeface="+mn-lt"/>
+                  <a:ea typeface="+mn-ea"/>
+                  <a:cs typeface="+mn-cs"/>
+                </a:defRPr>
+              </a:pPr>
+              <a:endParaRPr lang="de-DE"/>
+            </a:p>
+          </c:txPr>
+        </c:title>
+        <c:numFmt formatCode="0%" sourceLinked="0"/>
+        <c:majorTickMark val="none"/>
+        <c:minorTickMark val="none"/>
+        <c:tickLblPos val="nextTo"/>
+        <c:crossAx val="1214509119"/>
+        <c:crosses val="autoZero"/>
+        <c:crossBetween val="between"/>
+      </c:valAx>
+      <c:spPr>
+        <a:noFill/>
+        <a:ln>
+          <a:noFill/>
+        </a:ln>
+        <a:effectLst/>
+      </c:spPr>
+    </c:plotArea>
+    <c:plotVisOnly val="1"/>
+    <c:dispBlanksAs val="gap"/>
+    <c:extLst>
+      <c:ext xmlns:c16r3="http://schemas.microsoft.com/office/drawing/2017/03/chart" uri="{56B9EC1D-385E-4148-901F-78D8002777C0}">
+        <c16r3:dataDisplayOptions16>
+          <c16r3:dispNaAsBlank val="1"/>
+        </c16r3:dataDisplayOptions16>
+      </c:ext>
+    </c:extLst>
+    <c:showDLblsOverMax val="0"/>
+  </c:chart>
+  <c:spPr>
+    <a:noFill/>
+    <a:ln>
+      <a:noFill/>
+    </a:ln>
+    <a:effectLst/>
+  </c:spPr>
+  <c:txPr>
+    <a:bodyPr/>
+    <a:lstStyle/>
+    <a:p>
+      <a:pPr>
+        <a:defRPr/>
+      </a:pPr>
+      <a:endParaRPr lang="de-DE"/>
+    </a:p>
+  </c:txPr>
+  <c:externalData r:id="rId3">
+    <c:autoUpdate val="0"/>
+  </c:externalData>
+</c:chartSpace>
+</file>
+
+<file path=ppt/charts/colors1.xml><?xml version="1.0" encoding="utf-8"?>
+<cs:colorStyle xmlns:cs="http://schemas.microsoft.com/office/drawing/2012/chartStyle" xmlns:a="http://schemas.openxmlformats.org/drawingml/2006/main" meth="cycle" id="10">
+  <a:schemeClr val="accent1"/>
+  <a:schemeClr val="accent2"/>
+  <a:schemeClr val="accent3"/>
+  <a:schemeClr val="accent4"/>
+  <a:schemeClr val="accent5"/>
+  <a:schemeClr val="accent6"/>
+  <cs:variation/>
+  <cs:variation>
+    <a:lumMod val="60000"/>
+  </cs:variation>
+  <cs:variation>
+    <a:lumMod val="80000"/>
+    <a:lumOff val="20000"/>
+  </cs:variation>
+  <cs:variation>
+    <a:lumMod val="80000"/>
+  </cs:variation>
+  <cs:variation>
+    <a:lumMod val="60000"/>
+    <a:lumOff val="40000"/>
+  </cs:variation>
+  <cs:variation>
+    <a:lumMod val="50000"/>
+  </cs:variation>
+  <cs:variation>
+    <a:lumMod val="70000"/>
+    <a:lumOff val="30000"/>
+  </cs:variation>
+  <cs:variation>
+    <a:lumMod val="70000"/>
+  </cs:variation>
+  <cs:variation>
+    <a:lumMod val="50000"/>
+    <a:lumOff val="50000"/>
+  </cs:variation>
+</cs:colorStyle>
+</file>
+
+<file path=ppt/charts/colors2.xml><?xml version="1.0" encoding="utf-8"?>
+<cs:colorStyle xmlns:cs="http://schemas.microsoft.com/office/drawing/2012/chartStyle" xmlns:a="http://schemas.openxmlformats.org/drawingml/2006/main" meth="cycle" id="10">
+  <a:schemeClr val="accent1"/>
+  <a:schemeClr val="accent2"/>
+  <a:schemeClr val="accent3"/>
+  <a:schemeClr val="accent4"/>
+  <a:schemeClr val="accent5"/>
+  <a:schemeClr val="accent6"/>
+  <cs:variation/>
+  <cs:variation>
+    <a:lumMod val="60000"/>
+  </cs:variation>
+  <cs:variation>
+    <a:lumMod val="80000"/>
+    <a:lumOff val="20000"/>
+  </cs:variation>
+  <cs:variation>
+    <a:lumMod val="80000"/>
+  </cs:variation>
+  <cs:variation>
+    <a:lumMod val="60000"/>
+    <a:lumOff val="40000"/>
+  </cs:variation>
+  <cs:variation>
+    <a:lumMod val="50000"/>
+  </cs:variation>
+  <cs:variation>
+    <a:lumMod val="70000"/>
+    <a:lumOff val="30000"/>
+  </cs:variation>
+  <cs:variation>
+    <a:lumMod val="70000"/>
+  </cs:variation>
+  <cs:variation>
+    <a:lumMod val="50000"/>
+    <a:lumOff val="50000"/>
+  </cs:variation>
+</cs:colorStyle>
+</file>
+
+<file path=ppt/charts/style1.xml><?xml version="1.0" encoding="utf-8"?>
+<cs:chartStyle xmlns:cs="http://schemas.microsoft.com/office/drawing/2012/chartStyle" xmlns:a="http://schemas.openxmlformats.org/drawingml/2006/main" id="340">
+  <cs:axisTitle>
+    <cs:lnRef idx="0"/>
+    <cs:fillRef idx="0"/>
+    <cs:effectRef idx="0"/>
+    <cs:fontRef idx="minor">
+      <a:schemeClr val="tx1">
+        <a:lumMod val="65000"/>
+        <a:lumOff val="35000"/>
+      </a:schemeClr>
+    </cs:fontRef>
+    <cs:defRPr sz="1197" kern="1200"/>
+  </cs:axisTitle>
+  <cs:categoryAxis>
+    <cs:lnRef idx="0"/>
+    <cs:fillRef idx="0"/>
+    <cs:effectRef idx="0"/>
+    <cs:fontRef idx="minor">
+      <a:schemeClr val="tx1">
+        <a:lumMod val="65000"/>
+        <a:lumOff val="35000"/>
+      </a:schemeClr>
+    </cs:fontRef>
+    <cs:spPr>
+      <a:ln w="12700" cap="flat" cmpd="sng" algn="ctr">
+        <a:solidFill>
+          <a:schemeClr val="tx1">
+            <a:lumMod val="15000"/>
+            <a:lumOff val="85000"/>
+          </a:schemeClr>
+        </a:solidFill>
+        <a:round/>
+      </a:ln>
+    </cs:spPr>
+    <cs:defRPr sz="1197" kern="1200"/>
+  </cs:categoryAxis>
+  <cs:chartArea mods="allowNoFillOverride allowNoLineOverride">
+    <cs:lnRef idx="0"/>
+    <cs:fillRef idx="0"/>
+    <cs:effectRef idx="0"/>
+    <cs:fontRef idx="minor">
+      <a:schemeClr val="tx2"/>
+    </cs:fontRef>
+    <cs:spPr>
+      <a:solidFill>
+        <a:schemeClr val="bg1"/>
+      </a:solidFill>
+      <a:ln w="9525" cap="flat" cmpd="sng" algn="ctr">
+        <a:solidFill>
+          <a:schemeClr val="tx1">
+            <a:lumMod val="15000"/>
+            <a:lumOff val="85000"/>
+          </a:schemeClr>
+        </a:solidFill>
+        <a:round/>
+      </a:ln>
+    </cs:spPr>
+    <cs:defRPr sz="1197" kern="1200"/>
+  </cs:chartArea>
+  <cs:dataLabel>
+    <cs:lnRef idx="0"/>
+    <cs:fillRef idx="0"/>
+    <cs:effectRef idx="0"/>
+    <cs:fontRef idx="minor">
+      <a:schemeClr val="tx1">
+        <a:lumMod val="75000"/>
+        <a:lumOff val="25000"/>
+      </a:schemeClr>
+    </cs:fontRef>
+    <cs:defRPr sz="1197" kern="1200"/>
+  </cs:dataLabel>
+  <cs:dataLabelCallout>
+    <cs:lnRef idx="0"/>
+    <cs:fillRef idx="0"/>
+    <cs:effectRef idx="0"/>
+    <cs:fontRef idx="minor">
+      <a:schemeClr val="dk1">
+        <a:lumMod val="65000"/>
+        <a:lumOff val="35000"/>
+      </a:schemeClr>
+    </cs:fontRef>
+    <cs:spPr>
+      <a:solidFill>
+        <a:schemeClr val="lt1"/>
+      </a:solidFill>
+      <a:ln>
+        <a:solidFill>
+          <a:schemeClr val="dk1">
+            <a:lumMod val="25000"/>
+            <a:lumOff val="75000"/>
+          </a:schemeClr>
+        </a:solidFill>
+      </a:ln>
+    </cs:spPr>
+    <cs:defRPr sz="1197" kern="1200"/>
+    <cs:bodyPr rot="0" spcFirstLastPara="1" vertOverflow="clip" horzOverflow="clip" vert="horz" wrap="square" lIns="36576" tIns="18288" rIns="36576" bIns="18288" anchor="ctr" anchorCtr="1">
+      <a:spAutoFit/>
+    </cs:bodyPr>
+  </cs:dataLabelCallout>
+  <cs:dataPoint>
+    <cs:lnRef idx="0"/>
+    <cs:fillRef idx="3">
+      <cs:styleClr val="auto"/>
+    </cs:fillRef>
+    <cs:effectRef idx="3"/>
+    <cs:fontRef idx="minor">
+      <a:schemeClr val="lt1"/>
+    </cs:fontRef>
+  </cs:dataPoint>
+  <cs:dataPoint3D>
+    <cs:lnRef idx="0"/>
+    <cs:fillRef idx="3">
+      <cs:styleClr val="auto"/>
+    </cs:fillRef>
+    <cs:effectRef idx="3"/>
+    <cs:fontRef idx="minor">
+      <a:schemeClr val="lt1"/>
+    </cs:fontRef>
+  </cs:dataPoint3D>
+  <cs:dataPointLine>
+    <cs:lnRef idx="0">
+      <cs:styleClr val="auto"/>
+    </cs:lnRef>
+    <cs:fillRef idx="3"/>
+    <cs:effectRef idx="3"/>
+    <cs:fontRef idx="minor">
+      <a:schemeClr val="lt1"/>
+    </cs:fontRef>
+    <cs:spPr>
+      <a:ln w="34925" cap="rnd">
+        <a:solidFill>
+          <a:schemeClr val="phClr"/>
+        </a:solidFill>
+        <a:round/>
+      </a:ln>
+    </cs:spPr>
+  </cs:dataPointLine>
+  <cs:dataPointMarker>
+    <cs:lnRef idx="0">
+      <cs:styleClr val="auto"/>
+    </cs:lnRef>
+    <cs:fillRef idx="3">
+      <cs:styleClr val="auto"/>
+    </cs:fillRef>
+    <cs:effectRef idx="3"/>
+    <cs:fontRef idx="minor">
+      <a:schemeClr val="lt1"/>
+    </cs:fontRef>
+    <cs:spPr>
+      <a:ln w="9525">
+        <a:solidFill>
+          <a:schemeClr val="phClr"/>
+        </a:solidFill>
+        <a:round/>
+      </a:ln>
+    </cs:spPr>
+  </cs:dataPointMarker>
+  <cs:dataPointMarkerLayout symbol="circle" size="6"/>
+  <cs:dataPointWireframe>
+    <cs:lnRef idx="0">
+      <cs:styleClr val="auto"/>
+    </cs:lnRef>
+    <cs:fillRef idx="3"/>
+    <cs:effectRef idx="3"/>
+    <cs:fontRef idx="minor">
+      <a:schemeClr val="lt1"/>
+    </cs:fontRef>
+    <cs:spPr>
+      <a:ln w="9525" cap="rnd">
+        <a:solidFill>
+          <a:schemeClr val="phClr"/>
+        </a:solidFill>
+        <a:round/>
+      </a:ln>
+    </cs:spPr>
+  </cs:dataPointWireframe>
+  <cs:dataTable>
+    <cs:lnRef idx="0"/>
+    <cs:fillRef idx="0"/>
+    <cs:effectRef idx="0"/>
+    <cs:fontRef idx="minor">
+      <a:schemeClr val="tx1">
+        <a:lumMod val="65000"/>
+        <a:lumOff val="35000"/>
+      </a:schemeClr>
+    </cs:fontRef>
+    <cs:spPr>
+      <a:noFill/>
+      <a:ln w="9525" cap="flat" cmpd="sng" algn="ctr">
+        <a:solidFill>
+          <a:schemeClr val="tx1">
+            <a:lumMod val="15000"/>
+            <a:lumOff val="85000"/>
+          </a:schemeClr>
+        </a:solidFill>
+        <a:round/>
+      </a:ln>
+    </cs:spPr>
+    <cs:defRPr sz="1197" kern="1200"/>
+  </cs:dataTable>
+  <cs:downBar>
+    <cs:lnRef idx="0"/>
+    <cs:fillRef idx="0"/>
+    <cs:effectRef idx="0"/>
+    <cs:fontRef idx="minor">
+      <a:schemeClr val="dk1"/>
+    </cs:fontRef>
+    <cs:spPr>
+      <a:solidFill>
+        <a:schemeClr val="dk1">
+          <a:lumMod val="65000"/>
+          <a:lumOff val="35000"/>
+        </a:schemeClr>
+      </a:solidFill>
+      <a:ln w="9525">
+        <a:solidFill>
+          <a:schemeClr val="tx1">
+            <a:lumMod val="65000"/>
+            <a:lumOff val="35000"/>
+          </a:schemeClr>
+        </a:solidFill>
+      </a:ln>
+    </cs:spPr>
+  </cs:downBar>
+  <cs:dropLine>
+    <cs:lnRef idx="0"/>
+    <cs:fillRef idx="0"/>
+    <cs:effectRef idx="0"/>
+    <cs:fontRef idx="minor">
+      <a:schemeClr val="tx1"/>
+    </cs:fontRef>
+    <cs:spPr>
+      <a:ln w="9525" cap="flat" cmpd="sng" algn="ctr">
+        <a:solidFill>
+          <a:schemeClr val="tx1">
+            <a:lumMod val="35000"/>
+            <a:lumOff val="65000"/>
+          </a:schemeClr>
+        </a:solidFill>
+        <a:round/>
+      </a:ln>
+    </cs:spPr>
+  </cs:dropLine>
+  <cs:errorBar>
+    <cs:lnRef idx="0"/>
+    <cs:fillRef idx="0"/>
+    <cs:effectRef idx="0"/>
+    <cs:fontRef idx="minor">
+      <a:schemeClr val="tx1"/>
+    </cs:fontRef>
+    <cs:spPr>
+      <a:ln w="9525" cap="flat" cmpd="sng" algn="ctr">
+        <a:solidFill>
+          <a:schemeClr val="tx1">
+            <a:lumMod val="65000"/>
+            <a:lumOff val="35000"/>
+          </a:schemeClr>
+        </a:solidFill>
+        <a:round/>
+      </a:ln>
+    </cs:spPr>
+  </cs:errorBar>
+  <cs:floor>
+    <cs:lnRef idx="0"/>
+    <cs:fillRef idx="0"/>
+    <cs:effectRef idx="0"/>
+    <cs:fontRef idx="minor">
+      <a:schemeClr val="lt1"/>
+    </cs:fontRef>
+  </cs:floor>
+  <cs:gridlineMajor>
+    <cs:lnRef idx="0"/>
+    <cs:fillRef idx="0"/>
+    <cs:effectRef idx="0"/>
+    <cs:fontRef idx="minor">
+      <a:schemeClr val="tx1"/>
+    </cs:fontRef>
+    <cs:spPr>
+      <a:ln w="9525" cap="flat" cmpd="sng" algn="ctr">
+        <a:solidFill>
+          <a:schemeClr val="tx1">
+            <a:lumMod val="15000"/>
+            <a:lumOff val="85000"/>
+          </a:schemeClr>
+        </a:solidFill>
+        <a:round/>
+      </a:ln>
+    </cs:spPr>
+  </cs:gridlineMajor>
+  <cs:gridlineMinor>
+    <cs:lnRef idx="0"/>
+    <cs:fillRef idx="0"/>
+    <cs:effectRef idx="0"/>
+    <cs:fontRef idx="minor">
+      <a:schemeClr val="tx1"/>
+    </cs:fontRef>
+    <cs:spPr>
+      <a:ln w="9525" cap="flat" cmpd="sng" algn="ctr">
+        <a:solidFill>
+          <a:schemeClr val="tx1">
+            <a:lumMod val="5000"/>
+            <a:lumOff val="95000"/>
+          </a:schemeClr>
+        </a:solidFill>
+        <a:round/>
+      </a:ln>
+    </cs:spPr>
+  </cs:gridlineMinor>
+  <cs:hiLoLine>
+    <cs:lnRef idx="0"/>
+    <cs:fillRef idx="0"/>
+    <cs:effectRef idx="0"/>
+    <cs:fontRef idx="minor">
+      <a:schemeClr val="tx1"/>
+    </cs:fontRef>
+    <cs:spPr>
+      <a:ln w="9525" cap="flat" cmpd="sng" algn="ctr">
+        <a:solidFill>
+          <a:schemeClr val="tx1">
+            <a:lumMod val="75000"/>
+            <a:lumOff val="25000"/>
+          </a:schemeClr>
+        </a:solidFill>
+        <a:round/>
+      </a:ln>
+    </cs:spPr>
+  </cs:hiLoLine>
+  <cs:leaderLine>
+    <cs:lnRef idx="0"/>
+    <cs:fillRef idx="0"/>
+    <cs:effectRef idx="0"/>
+    <cs:fontRef idx="minor">
+      <a:schemeClr val="tx1"/>
+    </cs:fontRef>
+    <cs:spPr>
+      <a:ln w="9525" cap="flat" cmpd="sng" algn="ctr">
+        <a:solidFill>
+          <a:schemeClr val="tx1">
+            <a:lumMod val="35000"/>
+            <a:lumOff val="65000"/>
+          </a:schemeClr>
+        </a:solidFill>
+        <a:round/>
+      </a:ln>
+    </cs:spPr>
+  </cs:leaderLine>
+  <cs:legend>
+    <cs:lnRef idx="0"/>
+    <cs:fillRef idx="0"/>
+    <cs:effectRef idx="0"/>
+    <cs:fontRef idx="minor">
+      <a:schemeClr val="tx1">
+        <a:lumMod val="65000"/>
+        <a:lumOff val="35000"/>
+      </a:schemeClr>
+    </cs:fontRef>
+    <cs:defRPr sz="1197" kern="1200"/>
+  </cs:legend>
+  <cs:plotArea>
+    <cs:lnRef idx="0"/>
+    <cs:fillRef idx="0"/>
+    <cs:effectRef idx="0"/>
+    <cs:fontRef idx="minor">
+      <a:schemeClr val="lt1"/>
+    </cs:fontRef>
+  </cs:plotArea>
+  <cs:plotArea3D>
+    <cs:lnRef idx="0"/>
+    <cs:fillRef idx="0"/>
+    <cs:effectRef idx="0"/>
+    <cs:fontRef idx="minor">
+      <a:schemeClr val="lt1"/>
+    </cs:fontRef>
+  </cs:plotArea3D>
+  <cs:seriesAxis>
+    <cs:lnRef idx="0"/>
+    <cs:fillRef idx="0"/>
+    <cs:effectRef idx="0"/>
+    <cs:fontRef idx="minor">
+      <a:schemeClr val="tx1">
+        <a:lumMod val="65000"/>
+        <a:lumOff val="35000"/>
+      </a:schemeClr>
+    </cs:fontRef>
+    <cs:spPr>
+      <a:ln w="12700" cap="flat" cmpd="sng" algn="ctr">
+        <a:solidFill>
+          <a:schemeClr val="tx1">
+            <a:lumMod val="15000"/>
+            <a:lumOff val="85000"/>
+          </a:schemeClr>
+        </a:solidFill>
+        <a:round/>
+      </a:ln>
+    </cs:spPr>
+    <cs:defRPr sz="1197" kern="1200"/>
+  </cs:seriesAxis>
+  <cs:seriesLine>
+    <cs:lnRef idx="0"/>
+    <cs:fillRef idx="0"/>
+    <cs:effectRef idx="0"/>
+    <cs:fontRef idx="minor">
+      <a:schemeClr val="tx1"/>
+    </cs:fontRef>
+    <cs:spPr>
+      <a:ln w="9525" cap="flat" cmpd="sng" algn="ctr">
+        <a:solidFill>
+          <a:schemeClr val="tx1">
+            <a:lumMod val="35000"/>
+            <a:lumOff val="65000"/>
+          </a:schemeClr>
+        </a:solidFill>
+        <a:round/>
+      </a:ln>
+    </cs:spPr>
+  </cs:seriesLine>
+  <cs:title>
+    <cs:lnRef idx="0"/>
+    <cs:fillRef idx="0"/>
+    <cs:effectRef idx="0"/>
+    <cs:fontRef idx="minor">
+      <a:schemeClr val="tx1">
+        <a:lumMod val="65000"/>
+        <a:lumOff val="35000"/>
+      </a:schemeClr>
+    </cs:fontRef>
+    <cs:defRPr sz="2128" b="1" kern="1200" baseline="0"/>
+  </cs:title>
+  <cs:trendline>
+    <cs:lnRef idx="0">
+      <cs:styleClr val="auto"/>
+    </cs:lnRef>
+    <cs:fillRef idx="0"/>
+    <cs:effectRef idx="0"/>
+    <cs:fontRef idx="minor">
+      <a:schemeClr val="lt1"/>
+    </cs:fontRef>
+    <cs:spPr>
+      <a:ln w="19050" cap="rnd">
+        <a:solidFill>
+          <a:schemeClr val="phClr"/>
+        </a:solidFill>
+      </a:ln>
+    </cs:spPr>
+  </cs:trendline>
+  <cs:trendlineLabel>
+    <cs:lnRef idx="0"/>
+    <cs:fillRef idx="0"/>
+    <cs:effectRef idx="0"/>
+    <cs:fontRef idx="minor">
+      <a:schemeClr val="tx1">
+        <a:lumMod val="65000"/>
+        <a:lumOff val="35000"/>
+      </a:schemeClr>
+    </cs:fontRef>
+    <cs:defRPr sz="1197" kern="1200"/>
+  </cs:trendlineLabel>
+  <cs:upBar>
+    <cs:lnRef idx="0"/>
+    <cs:fillRef idx="0"/>
+    <cs:effectRef idx="0"/>
+    <cs:fontRef idx="minor">
+      <a:schemeClr val="dk1"/>
+    </cs:fontRef>
+    <cs:spPr>
+      <a:solidFill>
+        <a:schemeClr val="lt1"/>
+      </a:solidFill>
+      <a:ln w="9525">
+        <a:solidFill>
+          <a:schemeClr val="tx1">
+            <a:lumMod val="15000"/>
+            <a:lumOff val="85000"/>
+          </a:schemeClr>
+        </a:solidFill>
+      </a:ln>
+    </cs:spPr>
+  </cs:upBar>
+  <cs:valueAxis>
+    <cs:lnRef idx="0"/>
+    <cs:fillRef idx="0"/>
+    <cs:effectRef idx="0"/>
+    <cs:fontRef idx="minor">
+      <a:schemeClr val="tx1">
+        <a:lumMod val="65000"/>
+        <a:lumOff val="35000"/>
+      </a:schemeClr>
+    </cs:fontRef>
+    <cs:defRPr sz="1197" kern="1200"/>
+  </cs:valueAxis>
+  <cs:wall>
+    <cs:lnRef idx="0"/>
+    <cs:fillRef idx="0"/>
+    <cs:effectRef idx="0"/>
+    <cs:fontRef idx="minor">
+      <a:schemeClr val="lt1"/>
+    </cs:fontRef>
+  </cs:wall>
+</cs:chartStyle>
+</file>
+
+<file path=ppt/charts/style2.xml><?xml version="1.0" encoding="utf-8"?>
+<cs:chartStyle xmlns:cs="http://schemas.microsoft.com/office/drawing/2012/chartStyle" xmlns:a="http://schemas.openxmlformats.org/drawingml/2006/main" id="340">
+  <cs:axisTitle>
+    <cs:lnRef idx="0"/>
+    <cs:fillRef idx="0"/>
+    <cs:effectRef idx="0"/>
+    <cs:fontRef idx="minor">
+      <a:schemeClr val="tx1">
+        <a:lumMod val="65000"/>
+        <a:lumOff val="35000"/>
+      </a:schemeClr>
+    </cs:fontRef>
+    <cs:defRPr sz="1197" kern="1200"/>
+  </cs:axisTitle>
+  <cs:categoryAxis>
+    <cs:lnRef idx="0"/>
+    <cs:fillRef idx="0"/>
+    <cs:effectRef idx="0"/>
+    <cs:fontRef idx="minor">
+      <a:schemeClr val="tx1">
+        <a:lumMod val="65000"/>
+        <a:lumOff val="35000"/>
+      </a:schemeClr>
+    </cs:fontRef>
+    <cs:spPr>
+      <a:ln w="12700" cap="flat" cmpd="sng" algn="ctr">
+        <a:solidFill>
+          <a:schemeClr val="tx1">
+            <a:lumMod val="15000"/>
+            <a:lumOff val="85000"/>
+          </a:schemeClr>
+        </a:solidFill>
+        <a:round/>
+      </a:ln>
+    </cs:spPr>
+    <cs:defRPr sz="1197" kern="1200"/>
+  </cs:categoryAxis>
+  <cs:chartArea mods="allowNoFillOverride allowNoLineOverride">
+    <cs:lnRef idx="0"/>
+    <cs:fillRef idx="0"/>
+    <cs:effectRef idx="0"/>
+    <cs:fontRef idx="minor">
+      <a:schemeClr val="tx2"/>
+    </cs:fontRef>
+    <cs:spPr>
+      <a:solidFill>
+        <a:schemeClr val="bg1"/>
+      </a:solidFill>
+      <a:ln w="9525" cap="flat" cmpd="sng" algn="ctr">
+        <a:solidFill>
+          <a:schemeClr val="tx1">
+            <a:lumMod val="15000"/>
+            <a:lumOff val="85000"/>
+          </a:schemeClr>
+        </a:solidFill>
+        <a:round/>
+      </a:ln>
+    </cs:spPr>
+    <cs:defRPr sz="1197" kern="1200"/>
+  </cs:chartArea>
+  <cs:dataLabel>
+    <cs:lnRef idx="0"/>
+    <cs:fillRef idx="0"/>
+    <cs:effectRef idx="0"/>
+    <cs:fontRef idx="minor">
+      <a:schemeClr val="tx1">
+        <a:lumMod val="75000"/>
+        <a:lumOff val="25000"/>
+      </a:schemeClr>
+    </cs:fontRef>
+    <cs:defRPr sz="1197" kern="1200"/>
+  </cs:dataLabel>
+  <cs:dataLabelCallout>
+    <cs:lnRef idx="0"/>
+    <cs:fillRef idx="0"/>
+    <cs:effectRef idx="0"/>
+    <cs:fontRef idx="minor">
+      <a:schemeClr val="dk1">
+        <a:lumMod val="65000"/>
+        <a:lumOff val="35000"/>
+      </a:schemeClr>
+    </cs:fontRef>
+    <cs:spPr>
+      <a:solidFill>
+        <a:schemeClr val="lt1"/>
+      </a:solidFill>
+      <a:ln>
+        <a:solidFill>
+          <a:schemeClr val="dk1">
+            <a:lumMod val="25000"/>
+            <a:lumOff val="75000"/>
+          </a:schemeClr>
+        </a:solidFill>
+      </a:ln>
+    </cs:spPr>
+    <cs:defRPr sz="1197" kern="1200"/>
+    <cs:bodyPr rot="0" spcFirstLastPara="1" vertOverflow="clip" horzOverflow="clip" vert="horz" wrap="square" lIns="36576" tIns="18288" rIns="36576" bIns="18288" anchor="ctr" anchorCtr="1">
+      <a:spAutoFit/>
+    </cs:bodyPr>
+  </cs:dataLabelCallout>
+  <cs:dataPoint>
+    <cs:lnRef idx="0"/>
+    <cs:fillRef idx="3">
+      <cs:styleClr val="auto"/>
+    </cs:fillRef>
+    <cs:effectRef idx="3"/>
+    <cs:fontRef idx="minor">
+      <a:schemeClr val="lt1"/>
+    </cs:fontRef>
+  </cs:dataPoint>
+  <cs:dataPoint3D>
+    <cs:lnRef idx="0"/>
+    <cs:fillRef idx="3">
+      <cs:styleClr val="auto"/>
+    </cs:fillRef>
+    <cs:effectRef idx="3"/>
+    <cs:fontRef idx="minor">
+      <a:schemeClr val="lt1"/>
+    </cs:fontRef>
+  </cs:dataPoint3D>
+  <cs:dataPointLine>
+    <cs:lnRef idx="0">
+      <cs:styleClr val="auto"/>
+    </cs:lnRef>
+    <cs:fillRef idx="3"/>
+    <cs:effectRef idx="3"/>
+    <cs:fontRef idx="minor">
+      <a:schemeClr val="lt1"/>
+    </cs:fontRef>
+    <cs:spPr>
+      <a:ln w="34925" cap="rnd">
+        <a:solidFill>
+          <a:schemeClr val="phClr"/>
+        </a:solidFill>
+        <a:round/>
+      </a:ln>
+    </cs:spPr>
+  </cs:dataPointLine>
+  <cs:dataPointMarker>
+    <cs:lnRef idx="0">
+      <cs:styleClr val="auto"/>
+    </cs:lnRef>
+    <cs:fillRef idx="3">
+      <cs:styleClr val="auto"/>
+    </cs:fillRef>
+    <cs:effectRef idx="3"/>
+    <cs:fontRef idx="minor">
+      <a:schemeClr val="lt1"/>
+    </cs:fontRef>
+    <cs:spPr>
+      <a:ln w="9525">
+        <a:solidFill>
+          <a:schemeClr val="phClr"/>
+        </a:solidFill>
+        <a:round/>
+      </a:ln>
+    </cs:spPr>
+  </cs:dataPointMarker>
+  <cs:dataPointMarkerLayout symbol="circle" size="6"/>
+  <cs:dataPointWireframe>
+    <cs:lnRef idx="0">
+      <cs:styleClr val="auto"/>
+    </cs:lnRef>
+    <cs:fillRef idx="3"/>
+    <cs:effectRef idx="3"/>
+    <cs:fontRef idx="minor">
+      <a:schemeClr val="lt1"/>
+    </cs:fontRef>
+    <cs:spPr>
+      <a:ln w="9525" cap="rnd">
+        <a:solidFill>
+          <a:schemeClr val="phClr"/>
+        </a:solidFill>
+        <a:round/>
+      </a:ln>
+    </cs:spPr>
+  </cs:dataPointWireframe>
+  <cs:dataTable>
+    <cs:lnRef idx="0"/>
+    <cs:fillRef idx="0"/>
+    <cs:effectRef idx="0"/>
+    <cs:fontRef idx="minor">
+      <a:schemeClr val="tx1">
+        <a:lumMod val="65000"/>
+        <a:lumOff val="35000"/>
+      </a:schemeClr>
+    </cs:fontRef>
+    <cs:spPr>
+      <a:noFill/>
+      <a:ln w="9525" cap="flat" cmpd="sng" algn="ctr">
+        <a:solidFill>
+          <a:schemeClr val="tx1">
+            <a:lumMod val="15000"/>
+            <a:lumOff val="85000"/>
+          </a:schemeClr>
+        </a:solidFill>
+        <a:round/>
+      </a:ln>
+    </cs:spPr>
+    <cs:defRPr sz="1197" kern="1200"/>
+  </cs:dataTable>
+  <cs:downBar>
+    <cs:lnRef idx="0"/>
+    <cs:fillRef idx="0"/>
+    <cs:effectRef idx="0"/>
+    <cs:fontRef idx="minor">
+      <a:schemeClr val="dk1"/>
+    </cs:fontRef>
+    <cs:spPr>
+      <a:solidFill>
+        <a:schemeClr val="dk1">
+          <a:lumMod val="65000"/>
+          <a:lumOff val="35000"/>
+        </a:schemeClr>
+      </a:solidFill>
+      <a:ln w="9525">
+        <a:solidFill>
+          <a:schemeClr val="tx1">
+            <a:lumMod val="65000"/>
+            <a:lumOff val="35000"/>
+          </a:schemeClr>
+        </a:solidFill>
+      </a:ln>
+    </cs:spPr>
+  </cs:downBar>
+  <cs:dropLine>
+    <cs:lnRef idx="0"/>
+    <cs:fillRef idx="0"/>
+    <cs:effectRef idx="0"/>
+    <cs:fontRef idx="minor">
+      <a:schemeClr val="tx1"/>
+    </cs:fontRef>
+    <cs:spPr>
+      <a:ln w="9525" cap="flat" cmpd="sng" algn="ctr">
+        <a:solidFill>
+          <a:schemeClr val="tx1">
+            <a:lumMod val="35000"/>
+            <a:lumOff val="65000"/>
+          </a:schemeClr>
+        </a:solidFill>
+        <a:round/>
+      </a:ln>
+    </cs:spPr>
+  </cs:dropLine>
+  <cs:errorBar>
+    <cs:lnRef idx="0"/>
+    <cs:fillRef idx="0"/>
+    <cs:effectRef idx="0"/>
+    <cs:fontRef idx="minor">
+      <a:schemeClr val="tx1"/>
+    </cs:fontRef>
+    <cs:spPr>
+      <a:ln w="9525" cap="flat" cmpd="sng" algn="ctr">
+        <a:solidFill>
+          <a:schemeClr val="tx1">
+            <a:lumMod val="65000"/>
+            <a:lumOff val="35000"/>
+          </a:schemeClr>
+        </a:solidFill>
+        <a:round/>
+      </a:ln>
+    </cs:spPr>
+  </cs:errorBar>
+  <cs:floor>
+    <cs:lnRef idx="0"/>
+    <cs:fillRef idx="0"/>
+    <cs:effectRef idx="0"/>
+    <cs:fontRef idx="minor">
+      <a:schemeClr val="lt1"/>
+    </cs:fontRef>
+  </cs:floor>
+  <cs:gridlineMajor>
+    <cs:lnRef idx="0"/>
+    <cs:fillRef idx="0"/>
+    <cs:effectRef idx="0"/>
+    <cs:fontRef idx="minor">
+      <a:schemeClr val="tx1"/>
+    </cs:fontRef>
+    <cs:spPr>
+      <a:ln w="9525" cap="flat" cmpd="sng" algn="ctr">
+        <a:solidFill>
+          <a:schemeClr val="tx1">
+            <a:lumMod val="15000"/>
+            <a:lumOff val="85000"/>
+          </a:schemeClr>
+        </a:solidFill>
+        <a:round/>
+      </a:ln>
+    </cs:spPr>
+  </cs:gridlineMajor>
+  <cs:gridlineMinor>
+    <cs:lnRef idx="0"/>
+    <cs:fillRef idx="0"/>
+    <cs:effectRef idx="0"/>
+    <cs:fontRef idx="minor">
+      <a:schemeClr val="tx1"/>
+    </cs:fontRef>
+    <cs:spPr>
+      <a:ln w="9525" cap="flat" cmpd="sng" algn="ctr">
+        <a:solidFill>
+          <a:schemeClr val="tx1">
+            <a:lumMod val="5000"/>
+            <a:lumOff val="95000"/>
+          </a:schemeClr>
+        </a:solidFill>
+        <a:round/>
+      </a:ln>
+    </cs:spPr>
+  </cs:gridlineMinor>
+  <cs:hiLoLine>
+    <cs:lnRef idx="0"/>
+    <cs:fillRef idx="0"/>
+    <cs:effectRef idx="0"/>
+    <cs:fontRef idx="minor">
+      <a:schemeClr val="tx1"/>
+    </cs:fontRef>
+    <cs:spPr>
+      <a:ln w="9525" cap="flat" cmpd="sng" algn="ctr">
+        <a:solidFill>
+          <a:schemeClr val="tx1">
+            <a:lumMod val="75000"/>
+            <a:lumOff val="25000"/>
+          </a:schemeClr>
+        </a:solidFill>
+        <a:round/>
+      </a:ln>
+    </cs:spPr>
+  </cs:hiLoLine>
+  <cs:leaderLine>
+    <cs:lnRef idx="0"/>
+    <cs:fillRef idx="0"/>
+    <cs:effectRef idx="0"/>
+    <cs:fontRef idx="minor">
+      <a:schemeClr val="tx1"/>
+    </cs:fontRef>
+    <cs:spPr>
+      <a:ln w="9525" cap="flat" cmpd="sng" algn="ctr">
+        <a:solidFill>
+          <a:schemeClr val="tx1">
+            <a:lumMod val="35000"/>
+            <a:lumOff val="65000"/>
+          </a:schemeClr>
+        </a:solidFill>
+        <a:round/>
+      </a:ln>
+    </cs:spPr>
+  </cs:leaderLine>
+  <cs:legend>
+    <cs:lnRef idx="0"/>
+    <cs:fillRef idx="0"/>
+    <cs:effectRef idx="0"/>
+    <cs:fontRef idx="minor">
+      <a:schemeClr val="tx1">
+        <a:lumMod val="65000"/>
+        <a:lumOff val="35000"/>
+      </a:schemeClr>
+    </cs:fontRef>
+    <cs:defRPr sz="1197" kern="1200"/>
+  </cs:legend>
+  <cs:plotArea>
+    <cs:lnRef idx="0"/>
+    <cs:fillRef idx="0"/>
+    <cs:effectRef idx="0"/>
+    <cs:fontRef idx="minor">
+      <a:schemeClr val="lt1"/>
+    </cs:fontRef>
+  </cs:plotArea>
+  <cs:plotArea3D>
+    <cs:lnRef idx="0"/>
+    <cs:fillRef idx="0"/>
+    <cs:effectRef idx="0"/>
+    <cs:fontRef idx="minor">
+      <a:schemeClr val="lt1"/>
+    </cs:fontRef>
+  </cs:plotArea3D>
+  <cs:seriesAxis>
+    <cs:lnRef idx="0"/>
+    <cs:fillRef idx="0"/>
+    <cs:effectRef idx="0"/>
+    <cs:fontRef idx="minor">
+      <a:schemeClr val="tx1">
+        <a:lumMod val="65000"/>
+        <a:lumOff val="35000"/>
+      </a:schemeClr>
+    </cs:fontRef>
+    <cs:spPr>
+      <a:ln w="12700" cap="flat" cmpd="sng" algn="ctr">
+        <a:solidFill>
+          <a:schemeClr val="tx1">
+            <a:lumMod val="15000"/>
+            <a:lumOff val="85000"/>
+          </a:schemeClr>
+        </a:solidFill>
+        <a:round/>
+      </a:ln>
+    </cs:spPr>
+    <cs:defRPr sz="1197" kern="1200"/>
+  </cs:seriesAxis>
+  <cs:seriesLine>
+    <cs:lnRef idx="0"/>
+    <cs:fillRef idx="0"/>
+    <cs:effectRef idx="0"/>
+    <cs:fontRef idx="minor">
+      <a:schemeClr val="tx1"/>
+    </cs:fontRef>
+    <cs:spPr>
+      <a:ln w="9525" cap="flat" cmpd="sng" algn="ctr">
+        <a:solidFill>
+          <a:schemeClr val="tx1">
+            <a:lumMod val="35000"/>
+            <a:lumOff val="65000"/>
+          </a:schemeClr>
+        </a:solidFill>
+        <a:round/>
+      </a:ln>
+    </cs:spPr>
+  </cs:seriesLine>
+  <cs:title>
+    <cs:lnRef idx="0"/>
+    <cs:fillRef idx="0"/>
+    <cs:effectRef idx="0"/>
+    <cs:fontRef idx="minor">
+      <a:schemeClr val="tx1">
+        <a:lumMod val="65000"/>
+        <a:lumOff val="35000"/>
+      </a:schemeClr>
+    </cs:fontRef>
+    <cs:defRPr sz="2128" b="1" kern="1200" baseline="0"/>
+  </cs:title>
+  <cs:trendline>
+    <cs:lnRef idx="0">
+      <cs:styleClr val="auto"/>
+    </cs:lnRef>
+    <cs:fillRef idx="0"/>
+    <cs:effectRef idx="0"/>
+    <cs:fontRef idx="minor">
+      <a:schemeClr val="lt1"/>
+    </cs:fontRef>
+    <cs:spPr>
+      <a:ln w="19050" cap="rnd">
+        <a:solidFill>
+          <a:schemeClr val="phClr"/>
+        </a:solidFill>
+      </a:ln>
+    </cs:spPr>
+  </cs:trendline>
+  <cs:trendlineLabel>
+    <cs:lnRef idx="0"/>
+    <cs:fillRef idx="0"/>
+    <cs:effectRef idx="0"/>
+    <cs:fontRef idx="minor">
+      <a:schemeClr val="tx1">
+        <a:lumMod val="65000"/>
+        <a:lumOff val="35000"/>
+      </a:schemeClr>
+    </cs:fontRef>
+    <cs:defRPr sz="1197" kern="1200"/>
+  </cs:trendlineLabel>
+  <cs:upBar>
+    <cs:lnRef idx="0"/>
+    <cs:fillRef idx="0"/>
+    <cs:effectRef idx="0"/>
+    <cs:fontRef idx="minor">
+      <a:schemeClr val="dk1"/>
+    </cs:fontRef>
+    <cs:spPr>
+      <a:solidFill>
+        <a:schemeClr val="lt1"/>
+      </a:solidFill>
+      <a:ln w="9525">
+        <a:solidFill>
+          <a:schemeClr val="tx1">
+            <a:lumMod val="15000"/>
+            <a:lumOff val="85000"/>
+          </a:schemeClr>
+        </a:solidFill>
+      </a:ln>
+    </cs:spPr>
+  </cs:upBar>
+  <cs:valueAxis>
+    <cs:lnRef idx="0"/>
+    <cs:fillRef idx="0"/>
+    <cs:effectRef idx="0"/>
+    <cs:fontRef idx="minor">
+      <a:schemeClr val="tx1">
+        <a:lumMod val="65000"/>
+        <a:lumOff val="35000"/>
+      </a:schemeClr>
+    </cs:fontRef>
+    <cs:defRPr sz="1197" kern="1200"/>
+  </cs:valueAxis>
+  <cs:wall>
+    <cs:lnRef idx="0"/>
+    <cs:fillRef idx="0"/>
+    <cs:effectRef idx="0"/>
+    <cs:fontRef idx="minor">
+      <a:schemeClr val="lt1"/>
+    </cs:fontRef>
+  </cs:wall>
+</cs:chartStyle>
 </file>
 
 <file path=ppt/slideLayouts/slideLayout1.xml><?xml version="1.0" encoding="utf-8"?>
@@ -254,7 +2355,7 @@
           <a:p>
             <a:fld id="{D01E489E-8416-4F52-BF5D-4E930CE94E6E}" type="datetimeFigureOut">
               <a:rPr lang="de-DE" smtClean="0"/>
-              <a:t>15.04.2025</a:t>
+              <a:t>23.04.2025</a:t>
             </a:fld>
             <a:endParaRPr lang="de-DE"/>
           </a:p>
@@ -452,7 +2553,7 @@
           <a:p>
             <a:fld id="{D01E489E-8416-4F52-BF5D-4E930CE94E6E}" type="datetimeFigureOut">
               <a:rPr lang="de-DE" smtClean="0"/>
-              <a:t>15.04.2025</a:t>
+              <a:t>23.04.2025</a:t>
             </a:fld>
             <a:endParaRPr lang="de-DE"/>
           </a:p>
@@ -660,7 +2761,7 @@
           <a:p>
             <a:fld id="{D01E489E-8416-4F52-BF5D-4E930CE94E6E}" type="datetimeFigureOut">
               <a:rPr lang="de-DE" smtClean="0"/>
-              <a:t>15.04.2025</a:t>
+              <a:t>23.04.2025</a:t>
             </a:fld>
             <a:endParaRPr lang="de-DE"/>
           </a:p>
@@ -858,7 +2959,7 @@
           <a:p>
             <a:fld id="{D01E489E-8416-4F52-BF5D-4E930CE94E6E}" type="datetimeFigureOut">
               <a:rPr lang="de-DE" smtClean="0"/>
-              <a:t>15.04.2025</a:t>
+              <a:t>23.04.2025</a:t>
             </a:fld>
             <a:endParaRPr lang="de-DE"/>
           </a:p>
@@ -1133,7 +3234,7 @@
           <a:p>
             <a:fld id="{D01E489E-8416-4F52-BF5D-4E930CE94E6E}" type="datetimeFigureOut">
               <a:rPr lang="de-DE" smtClean="0"/>
-              <a:t>15.04.2025</a:t>
+              <a:t>23.04.2025</a:t>
             </a:fld>
             <a:endParaRPr lang="de-DE"/>
           </a:p>
@@ -1398,7 +3499,7 @@
           <a:p>
             <a:fld id="{D01E489E-8416-4F52-BF5D-4E930CE94E6E}" type="datetimeFigureOut">
               <a:rPr lang="de-DE" smtClean="0"/>
-              <a:t>15.04.2025</a:t>
+              <a:t>23.04.2025</a:t>
             </a:fld>
             <a:endParaRPr lang="de-DE"/>
           </a:p>
@@ -1810,7 +3911,7 @@
           <a:p>
             <a:fld id="{D01E489E-8416-4F52-BF5D-4E930CE94E6E}" type="datetimeFigureOut">
               <a:rPr lang="de-DE" smtClean="0"/>
-              <a:t>15.04.2025</a:t>
+              <a:t>23.04.2025</a:t>
             </a:fld>
             <a:endParaRPr lang="de-DE"/>
           </a:p>
@@ -1951,7 +4052,7 @@
           <a:p>
             <a:fld id="{D01E489E-8416-4F52-BF5D-4E930CE94E6E}" type="datetimeFigureOut">
               <a:rPr lang="de-DE" smtClean="0"/>
-              <a:t>15.04.2025</a:t>
+              <a:t>23.04.2025</a:t>
             </a:fld>
             <a:endParaRPr lang="de-DE"/>
           </a:p>
@@ -2064,7 +4165,7 @@
           <a:p>
             <a:fld id="{D01E489E-8416-4F52-BF5D-4E930CE94E6E}" type="datetimeFigureOut">
               <a:rPr lang="de-DE" smtClean="0"/>
-              <a:t>15.04.2025</a:t>
+              <a:t>23.04.2025</a:t>
             </a:fld>
             <a:endParaRPr lang="de-DE"/>
           </a:p>
@@ -2375,7 +4476,7 @@
           <a:p>
             <a:fld id="{D01E489E-8416-4F52-BF5D-4E930CE94E6E}" type="datetimeFigureOut">
               <a:rPr lang="de-DE" smtClean="0"/>
-              <a:t>15.04.2025</a:t>
+              <a:t>23.04.2025</a:t>
             </a:fld>
             <a:endParaRPr lang="de-DE"/>
           </a:p>
@@ -2663,7 +4764,7 @@
           <a:p>
             <a:fld id="{D01E489E-8416-4F52-BF5D-4E930CE94E6E}" type="datetimeFigureOut">
               <a:rPr lang="de-DE" smtClean="0"/>
-              <a:t>15.04.2025</a:t>
+              <a:t>23.04.2025</a:t>
             </a:fld>
             <a:endParaRPr lang="de-DE"/>
           </a:p>
@@ -2904,7 +5005,7 @@
           <a:p>
             <a:fld id="{D01E489E-8416-4F52-BF5D-4E930CE94E6E}" type="datetimeFigureOut">
               <a:rPr lang="de-DE" smtClean="0"/>
-              <a:t>15.04.2025</a:t>
+              <a:t>23.04.2025</a:t>
             </a:fld>
             <a:endParaRPr lang="de-DE"/>
           </a:p>
@@ -3337,37 +5438,97 @@
             <p:ph type="ctrTitle"/>
           </p:nvPr>
         </p:nvSpPr>
-        <p:spPr/>
+        <p:spPr>
+          <a:xfrm>
+            <a:off x="1524000" y="1791538"/>
+            <a:ext cx="9144000" cy="2387600"/>
+          </a:xfrm>
+        </p:spPr>
+        <p:txBody>
+          <a:bodyPr>
+            <a:normAutofit fontScale="90000"/>
+          </a:bodyPr>
+          <a:lstStyle/>
+          <a:p>
+            <a:br>
+              <a:rPr lang="en-US" dirty="0"/>
+            </a:br>
+            <a:br>
+              <a:rPr lang="en-US" dirty="0"/>
+            </a:br>
+            <a:br>
+              <a:rPr lang="en-US" dirty="0"/>
+            </a:br>
+            <a:br>
+              <a:rPr lang="en-US" dirty="0"/>
+            </a:br>
+            <a:r>
+              <a:rPr lang="en-US" dirty="0"/>
+              <a:t>Evaluation of </a:t>
+            </a:r>
+            <a:br>
+              <a:rPr lang="en-US" dirty="0"/>
+            </a:br>
+            <a:r>
+              <a:rPr lang="en-US" dirty="0"/>
+              <a:t>e-Fold Cross-Validation: </a:t>
+            </a:r>
+            <a:br>
+              <a:rPr lang="en-US" dirty="0"/>
+            </a:br>
+            <a:r>
+              <a:rPr lang="en-US" dirty="0"/>
+              <a:t>Initial Results</a:t>
+            </a:r>
+            <a:br>
+              <a:rPr lang="de-DE" dirty="0"/>
+            </a:br>
+            <a:r>
+              <a:rPr lang="de-DE" dirty="0"/>
+              <a:t> </a:t>
+            </a:r>
+          </a:p>
+        </p:txBody>
+      </p:sp>
+      <p:sp>
+        <p:nvSpPr>
+          <p:cNvPr id="3" name="Untertitel 2">
+            <a:extLst>
+              <a:ext uri="{FF2B5EF4-FFF2-40B4-BE49-F238E27FC236}">
+                <a16:creationId xmlns:a16="http://schemas.microsoft.com/office/drawing/2014/main" id="{80A6D8A6-743E-5368-50A1-EAD1C2758B90}"/>
+              </a:ext>
+            </a:extLst>
+          </p:cNvPr>
+          <p:cNvSpPr>
+            <a:spLocks noGrp="1"/>
+          </p:cNvSpPr>
+          <p:nvPr>
+            <p:ph type="subTitle" idx="1"/>
+          </p:nvPr>
+        </p:nvSpPr>
+        <p:spPr>
+          <a:xfrm>
+            <a:off x="1524000" y="4628660"/>
+            <a:ext cx="9144000" cy="1655762"/>
+          </a:xfrm>
+        </p:spPr>
         <p:txBody>
           <a:bodyPr/>
           <a:lstStyle/>
           <a:p>
-            <a:endParaRPr lang="de-DE"/>
-          </a:p>
-        </p:txBody>
-      </p:sp>
-      <p:sp>
-        <p:nvSpPr>
-          <p:cNvPr id="3" name="Untertitel 2">
-            <a:extLst>
-              <a:ext uri="{FF2B5EF4-FFF2-40B4-BE49-F238E27FC236}">
-                <a16:creationId xmlns:a16="http://schemas.microsoft.com/office/drawing/2014/main" id="{80A6D8A6-743E-5368-50A1-EAD1C2758B90}"/>
-              </a:ext>
-            </a:extLst>
-          </p:cNvPr>
-          <p:cNvSpPr>
-            <a:spLocks noGrp="1"/>
-          </p:cNvSpPr>
-          <p:nvPr>
-            <p:ph type="subTitle" idx="1"/>
-          </p:nvPr>
-        </p:nvSpPr>
-        <p:spPr/>
-        <p:txBody>
-          <a:bodyPr/>
-          <a:lstStyle/>
-          <a:p>
-            <a:endParaRPr lang="de-DE"/>
+            <a:r>
+              <a:rPr lang="de-DE" dirty="0"/>
+              <a:t>Nick Petker</a:t>
+            </a:r>
+          </a:p>
+          <a:p>
+            <a:r>
+              <a:rPr lang="de-DE" dirty="0"/>
+              <a:t>April 2025</a:t>
+            </a:r>
+          </a:p>
+          <a:p>
+            <a:endParaRPr lang="de-DE" dirty="0"/>
           </a:p>
         </p:txBody>
       </p:sp>
@@ -3375,6 +5536,1265 @@
     <p:extLst>
       <p:ext uri="{BB962C8B-B14F-4D97-AF65-F5344CB8AC3E}">
         <p14:creationId xmlns:p14="http://schemas.microsoft.com/office/powerpoint/2010/main" val="4059175697"/>
+      </p:ext>
+    </p:extLst>
+  </p:cSld>
+  <p:clrMapOvr>
+    <a:masterClrMapping/>
+  </p:clrMapOvr>
+</p:sld>
+</file>
+
+<file path=ppt/slides/slide2.xml><?xml version="1.0" encoding="utf-8"?>
+<p:sld xmlns:a="http://schemas.openxmlformats.org/drawingml/2006/main" xmlns:r="http://schemas.openxmlformats.org/officeDocument/2006/relationships" xmlns:p="http://schemas.openxmlformats.org/presentationml/2006/main">
+  <p:cSld>
+    <p:spTree>
+      <p:nvGrpSpPr>
+        <p:cNvPr id="1" name="">
+          <a:extLst>
+            <a:ext uri="{FF2B5EF4-FFF2-40B4-BE49-F238E27FC236}">
+              <a16:creationId xmlns:a16="http://schemas.microsoft.com/office/drawing/2014/main" id="{87E33465-2F48-27F9-2FA4-1748E3F9D7BD}"/>
+            </a:ext>
+          </a:extLst>
+        </p:cNvPr>
+        <p:cNvGrpSpPr/>
+        <p:nvPr/>
+      </p:nvGrpSpPr>
+      <p:grpSpPr>
+        <a:xfrm>
+          <a:off x="0" y="0"/>
+          <a:ext cx="0" cy="0"/>
+          <a:chOff x="0" y="0"/>
+          <a:chExt cx="0" cy="0"/>
+        </a:xfrm>
+      </p:grpSpPr>
+      <p:sp>
+        <p:nvSpPr>
+          <p:cNvPr id="2" name="Titel 1">
+            <a:extLst>
+              <a:ext uri="{FF2B5EF4-FFF2-40B4-BE49-F238E27FC236}">
+                <a16:creationId xmlns:a16="http://schemas.microsoft.com/office/drawing/2014/main" id="{33A36007-9E2A-AC0A-8CFB-322B23F082C4}"/>
+              </a:ext>
+            </a:extLst>
+          </p:cNvPr>
+          <p:cNvSpPr>
+            <a:spLocks noGrp="1"/>
+          </p:cNvSpPr>
+          <p:nvPr>
+            <p:ph type="title"/>
+          </p:nvPr>
+        </p:nvSpPr>
+        <p:spPr/>
+        <p:txBody>
+          <a:bodyPr/>
+          <a:lstStyle/>
+          <a:p>
+            <a:r>
+              <a:rPr lang="de-DE" dirty="0"/>
+              <a:t>Was ist e-</a:t>
+            </a:r>
+            <a:r>
+              <a:rPr lang="de-DE" dirty="0" err="1"/>
+              <a:t>Fold</a:t>
+            </a:r>
+            <a:r>
+              <a:rPr lang="de-DE" dirty="0"/>
+              <a:t> Cross-Validation?</a:t>
+            </a:r>
+          </a:p>
+        </p:txBody>
+      </p:sp>
+      <p:sp>
+        <p:nvSpPr>
+          <p:cNvPr id="3" name="Inhaltsplatzhalter 2">
+            <a:extLst>
+              <a:ext uri="{FF2B5EF4-FFF2-40B4-BE49-F238E27FC236}">
+                <a16:creationId xmlns:a16="http://schemas.microsoft.com/office/drawing/2014/main" id="{0FC643F7-359A-4DA0-1BE7-E2D3401BF2BA}"/>
+              </a:ext>
+            </a:extLst>
+          </p:cNvPr>
+          <p:cNvSpPr>
+            <a:spLocks noGrp="1"/>
+          </p:cNvSpPr>
+          <p:nvPr>
+            <p:ph idx="1"/>
+          </p:nvPr>
+        </p:nvSpPr>
+        <p:spPr/>
+        <p:txBody>
+          <a:bodyPr/>
+          <a:lstStyle/>
+          <a:p>
+            <a:endParaRPr lang="de-DE" dirty="0"/>
+          </a:p>
+          <a:p>
+            <a:r>
+              <a:rPr lang="de-DE" dirty="0"/>
+              <a:t>Dynamische Alternative zum k-</a:t>
+            </a:r>
+            <a:r>
+              <a:rPr lang="de-DE" dirty="0" err="1"/>
+              <a:t>Fold</a:t>
+            </a:r>
+            <a:r>
+              <a:rPr lang="de-DE" dirty="0"/>
+              <a:t> Cross-Validation, bei der die Anzahl an </a:t>
+            </a:r>
+            <a:r>
+              <a:rPr lang="de-DE" dirty="0" err="1"/>
+              <a:t>Folds</a:t>
+            </a:r>
+            <a:r>
+              <a:rPr lang="de-DE" dirty="0"/>
+              <a:t> nicht festgelegt ist, sondern durch eine dynamische Abbruchsbedingung bestimmt wird.</a:t>
+            </a:r>
+          </a:p>
+          <a:p>
+            <a:endParaRPr lang="de-DE" dirty="0"/>
+          </a:p>
+          <a:p>
+            <a:r>
+              <a:rPr lang="de-DE" dirty="0"/>
+              <a:t>Nach jedem </a:t>
+            </a:r>
+            <a:r>
+              <a:rPr lang="de-DE" dirty="0" err="1"/>
+              <a:t>Fold</a:t>
+            </a:r>
+            <a:r>
+              <a:rPr lang="de-DE" dirty="0"/>
+              <a:t> werden die Unterschiede zwischen den Ergebnissen überprüft. Wenn die Standardabweichung mehrfach sinkt, bricht das Verfahren ab.</a:t>
+            </a:r>
+          </a:p>
+          <a:p>
+            <a:pPr marL="0" indent="0">
+              <a:buNone/>
+            </a:pPr>
+            <a:endParaRPr lang="de-DE" dirty="0"/>
+          </a:p>
+          <a:p>
+            <a:endParaRPr lang="de-DE" dirty="0"/>
+          </a:p>
+        </p:txBody>
+      </p:sp>
+    </p:spTree>
+    <p:extLst>
+      <p:ext uri="{BB962C8B-B14F-4D97-AF65-F5344CB8AC3E}">
+        <p14:creationId xmlns:p14="http://schemas.microsoft.com/office/powerpoint/2010/main" val="1157109569"/>
+      </p:ext>
+    </p:extLst>
+  </p:cSld>
+  <p:clrMapOvr>
+    <a:masterClrMapping/>
+  </p:clrMapOvr>
+</p:sld>
+</file>
+
+<file path=ppt/slides/slide3.xml><?xml version="1.0" encoding="utf-8"?>
+<p:sld xmlns:a="http://schemas.openxmlformats.org/drawingml/2006/main" xmlns:r="http://schemas.openxmlformats.org/officeDocument/2006/relationships" xmlns:p="http://schemas.openxmlformats.org/presentationml/2006/main">
+  <p:cSld>
+    <p:spTree>
+      <p:nvGrpSpPr>
+        <p:cNvPr id="1" name="">
+          <a:extLst>
+            <a:ext uri="{FF2B5EF4-FFF2-40B4-BE49-F238E27FC236}">
+              <a16:creationId xmlns:a16="http://schemas.microsoft.com/office/drawing/2014/main" id="{FCE61356-8F93-B99C-0755-D4031743FCDB}"/>
+            </a:ext>
+          </a:extLst>
+        </p:cNvPr>
+        <p:cNvGrpSpPr/>
+        <p:nvPr/>
+      </p:nvGrpSpPr>
+      <p:grpSpPr>
+        <a:xfrm>
+          <a:off x="0" y="0"/>
+          <a:ext cx="0" cy="0"/>
+          <a:chOff x="0" y="0"/>
+          <a:chExt cx="0" cy="0"/>
+        </a:xfrm>
+      </p:grpSpPr>
+      <p:sp>
+        <p:nvSpPr>
+          <p:cNvPr id="15" name="Titel 14">
+            <a:extLst>
+              <a:ext uri="{FF2B5EF4-FFF2-40B4-BE49-F238E27FC236}">
+                <a16:creationId xmlns:a16="http://schemas.microsoft.com/office/drawing/2014/main" id="{F13640D6-C93D-9228-86D3-76D740E7E2CF}"/>
+              </a:ext>
+            </a:extLst>
+          </p:cNvPr>
+          <p:cNvSpPr>
+            <a:spLocks noGrp="1"/>
+          </p:cNvSpPr>
+          <p:nvPr>
+            <p:ph type="title"/>
+          </p:nvPr>
+        </p:nvSpPr>
+        <p:spPr>
+          <a:xfrm>
+            <a:off x="838200" y="128213"/>
+            <a:ext cx="10515600" cy="1325563"/>
+          </a:xfrm>
+        </p:spPr>
+        <p:txBody>
+          <a:bodyPr/>
+          <a:lstStyle/>
+          <a:p>
+            <a:pPr algn="ctr"/>
+            <a:r>
+              <a:rPr lang="de-DE" dirty="0"/>
+              <a:t>Anzahl </a:t>
+            </a:r>
+            <a:r>
+              <a:rPr lang="de-DE" dirty="0" err="1"/>
+              <a:t>Folds</a:t>
+            </a:r>
+            <a:endParaRPr lang="de-DE" dirty="0"/>
+          </a:p>
+        </p:txBody>
+      </p:sp>
+      <p:pic>
+        <p:nvPicPr>
+          <p:cNvPr id="19" name="Inhaltsplatzhalter 18">
+            <a:extLst>
+              <a:ext uri="{FF2B5EF4-FFF2-40B4-BE49-F238E27FC236}">
+                <a16:creationId xmlns:a16="http://schemas.microsoft.com/office/drawing/2014/main" id="{D708D0C4-515A-299A-B8A4-EB2935B7BCC8}"/>
+              </a:ext>
+            </a:extLst>
+          </p:cNvPr>
+          <p:cNvPicPr>
+            <a:picLocks noGrp="1" noChangeAspect="1"/>
+          </p:cNvPicPr>
+          <p:nvPr>
+            <p:ph sz="half" idx="1"/>
+          </p:nvPr>
+        </p:nvPicPr>
+        <p:blipFill>
+          <a:blip r:embed="rId2"/>
+          <a:stretch>
+            <a:fillRect/>
+          </a:stretch>
+        </p:blipFill>
+        <p:spPr>
+          <a:xfrm>
+            <a:off x="914400" y="1884624"/>
+            <a:ext cx="5181600" cy="1544376"/>
+          </a:xfrm>
+        </p:spPr>
+      </p:pic>
+      <p:pic>
+        <p:nvPicPr>
+          <p:cNvPr id="21" name="Inhaltsplatzhalter 20">
+            <a:extLst>
+              <a:ext uri="{FF2B5EF4-FFF2-40B4-BE49-F238E27FC236}">
+                <a16:creationId xmlns:a16="http://schemas.microsoft.com/office/drawing/2014/main" id="{1F783FD7-85DC-B043-A15E-DDD257BF5139}"/>
+              </a:ext>
+            </a:extLst>
+          </p:cNvPr>
+          <p:cNvPicPr>
+            <a:picLocks noGrp="1" noChangeAspect="1"/>
+          </p:cNvPicPr>
+          <p:nvPr>
+            <p:ph sz="half" idx="2"/>
+          </p:nvPr>
+        </p:nvPicPr>
+        <p:blipFill>
+          <a:blip r:embed="rId3"/>
+          <a:stretch>
+            <a:fillRect/>
+          </a:stretch>
+        </p:blipFill>
+        <p:spPr>
+          <a:xfrm>
+            <a:off x="6172200" y="1884624"/>
+            <a:ext cx="5181600" cy="1492300"/>
+          </a:xfrm>
+        </p:spPr>
+      </p:pic>
+      <p:pic>
+        <p:nvPicPr>
+          <p:cNvPr id="23" name="Grafik 22">
+            <a:extLst>
+              <a:ext uri="{FF2B5EF4-FFF2-40B4-BE49-F238E27FC236}">
+                <a16:creationId xmlns:a16="http://schemas.microsoft.com/office/drawing/2014/main" id="{7834E138-7A12-7449-883F-7F70CECC2581}"/>
+              </a:ext>
+            </a:extLst>
+          </p:cNvPr>
+          <p:cNvPicPr>
+            <a:picLocks noChangeAspect="1"/>
+          </p:cNvPicPr>
+          <p:nvPr/>
+        </p:nvPicPr>
+        <p:blipFill>
+          <a:blip r:embed="rId4"/>
+          <a:stretch>
+            <a:fillRect/>
+          </a:stretch>
+        </p:blipFill>
+        <p:spPr>
+          <a:xfrm>
+            <a:off x="6172201" y="3807772"/>
+            <a:ext cx="5181600" cy="2763064"/>
+          </a:xfrm>
+          <a:prstGeom prst="rect">
+            <a:avLst/>
+          </a:prstGeom>
+        </p:spPr>
+      </p:pic>
+      <p:graphicFrame>
+        <p:nvGraphicFramePr>
+          <p:cNvPr id="27" name="Diagramm 26">
+            <a:extLst>
+              <a:ext uri="{FF2B5EF4-FFF2-40B4-BE49-F238E27FC236}">
+                <a16:creationId xmlns:a16="http://schemas.microsoft.com/office/drawing/2014/main" id="{4A08AE43-D4B3-9F2F-7469-D25CF964B40F}"/>
+              </a:ext>
+            </a:extLst>
+          </p:cNvPr>
+          <p:cNvGraphicFramePr/>
+          <p:nvPr>
+            <p:extLst>
+              <p:ext uri="{D42A27DB-BD31-4B8C-83A1-F6EECF244321}">
+                <p14:modId xmlns:p14="http://schemas.microsoft.com/office/powerpoint/2010/main" val="3417344637"/>
+              </p:ext>
+            </p:extLst>
+          </p:nvPr>
+        </p:nvGraphicFramePr>
+        <p:xfrm>
+          <a:off x="868680" y="3807771"/>
+          <a:ext cx="4950229" cy="2792533"/>
+        </p:xfrm>
+        <a:graphic>
+          <a:graphicData uri="http://schemas.openxmlformats.org/drawingml/2006/chart">
+            <c:chart xmlns:c="http://schemas.openxmlformats.org/drawingml/2006/chart" xmlns:r="http://schemas.openxmlformats.org/officeDocument/2006/relationships" r:id="rId5"/>
+          </a:graphicData>
+        </a:graphic>
+      </p:graphicFrame>
+      <p:sp>
+        <p:nvSpPr>
+          <p:cNvPr id="28" name="Textfeld 27">
+            <a:extLst>
+              <a:ext uri="{FF2B5EF4-FFF2-40B4-BE49-F238E27FC236}">
+                <a16:creationId xmlns:a16="http://schemas.microsoft.com/office/drawing/2014/main" id="{7FD4D981-FBE5-21AF-1080-04CE6C8FE613}"/>
+              </a:ext>
+            </a:extLst>
+          </p:cNvPr>
+          <p:cNvSpPr txBox="1"/>
+          <p:nvPr/>
+        </p:nvSpPr>
+        <p:spPr>
+          <a:xfrm>
+            <a:off x="914400" y="1321187"/>
+            <a:ext cx="4904509" cy="369332"/>
+          </a:xfrm>
+          <a:prstGeom prst="rect">
+            <a:avLst/>
+          </a:prstGeom>
+          <a:noFill/>
+        </p:spPr>
+        <p:txBody>
+          <a:bodyPr wrap="square" rtlCol="0">
+            <a:spAutoFit/>
+          </a:bodyPr>
+          <a:lstStyle/>
+          <a:p>
+            <a:r>
+              <a:rPr lang="de-DE" b="1" dirty="0"/>
+              <a:t>Replizierte Werte	</a:t>
+            </a:r>
+          </a:p>
+        </p:txBody>
+      </p:sp>
+      <p:sp>
+        <p:nvSpPr>
+          <p:cNvPr id="29" name="Textfeld 28">
+            <a:extLst>
+              <a:ext uri="{FF2B5EF4-FFF2-40B4-BE49-F238E27FC236}">
+                <a16:creationId xmlns:a16="http://schemas.microsoft.com/office/drawing/2014/main" id="{2222582F-C25E-16A7-4EB9-0D860A16E0DD}"/>
+              </a:ext>
+            </a:extLst>
+          </p:cNvPr>
+          <p:cNvSpPr txBox="1"/>
+          <p:nvPr/>
+        </p:nvSpPr>
+        <p:spPr>
+          <a:xfrm>
+            <a:off x="6172200" y="1354015"/>
+            <a:ext cx="5105400" cy="369332"/>
+          </a:xfrm>
+          <a:prstGeom prst="rect">
+            <a:avLst/>
+          </a:prstGeom>
+          <a:noFill/>
+        </p:spPr>
+        <p:txBody>
+          <a:bodyPr wrap="square" rtlCol="0">
+            <a:spAutoFit/>
+          </a:bodyPr>
+          <a:lstStyle/>
+          <a:p>
+            <a:r>
+              <a:rPr lang="de-DE" b="1" dirty="0"/>
+              <a:t>Werte aus Paper</a:t>
+            </a:r>
+          </a:p>
+        </p:txBody>
+      </p:sp>
+    </p:spTree>
+    <p:extLst>
+      <p:ext uri="{BB962C8B-B14F-4D97-AF65-F5344CB8AC3E}">
+        <p14:creationId xmlns:p14="http://schemas.microsoft.com/office/powerpoint/2010/main" val="3840774004"/>
+      </p:ext>
+    </p:extLst>
+  </p:cSld>
+  <p:clrMapOvr>
+    <a:masterClrMapping/>
+  </p:clrMapOvr>
+</p:sld>
+</file>
+
+<file path=ppt/slides/slide4.xml><?xml version="1.0" encoding="utf-8"?>
+<p:sld xmlns:a="http://schemas.openxmlformats.org/drawingml/2006/main" xmlns:r="http://schemas.openxmlformats.org/officeDocument/2006/relationships" xmlns:p="http://schemas.openxmlformats.org/presentationml/2006/main">
+  <p:cSld>
+    <p:spTree>
+      <p:nvGrpSpPr>
+        <p:cNvPr id="1" name="">
+          <a:extLst>
+            <a:ext uri="{FF2B5EF4-FFF2-40B4-BE49-F238E27FC236}">
+              <a16:creationId xmlns:a16="http://schemas.microsoft.com/office/drawing/2014/main" id="{7153E222-C466-D01C-5C9A-9FAA4862D144}"/>
+            </a:ext>
+          </a:extLst>
+        </p:cNvPr>
+        <p:cNvGrpSpPr/>
+        <p:nvPr/>
+      </p:nvGrpSpPr>
+      <p:grpSpPr>
+        <a:xfrm>
+          <a:off x="0" y="0"/>
+          <a:ext cx="0" cy="0"/>
+          <a:chOff x="0" y="0"/>
+          <a:chExt cx="0" cy="0"/>
+        </a:xfrm>
+      </p:grpSpPr>
+      <p:sp>
+        <p:nvSpPr>
+          <p:cNvPr id="2" name="Titel 1">
+            <a:extLst>
+              <a:ext uri="{FF2B5EF4-FFF2-40B4-BE49-F238E27FC236}">
+                <a16:creationId xmlns:a16="http://schemas.microsoft.com/office/drawing/2014/main" id="{91CB5F08-1200-0D56-05CD-666BE131012A}"/>
+              </a:ext>
+            </a:extLst>
+          </p:cNvPr>
+          <p:cNvSpPr>
+            <a:spLocks noGrp="1"/>
+          </p:cNvSpPr>
+          <p:nvPr>
+            <p:ph type="title"/>
+          </p:nvPr>
+        </p:nvSpPr>
+        <p:spPr/>
+        <p:txBody>
+          <a:bodyPr/>
+          <a:lstStyle/>
+          <a:p>
+            <a:pPr algn="ctr"/>
+            <a:r>
+              <a:rPr lang="de-DE" dirty="0"/>
+              <a:t>Confidence </a:t>
+            </a:r>
+            <a:r>
+              <a:rPr lang="de-DE" dirty="0" err="1"/>
+              <a:t>Interval</a:t>
+            </a:r>
+            <a:r>
+              <a:rPr lang="de-DE" dirty="0"/>
+              <a:t> &amp; </a:t>
+            </a:r>
+            <a:r>
+              <a:rPr lang="de-DE" dirty="0" err="1"/>
+              <a:t>Percent</a:t>
+            </a:r>
+            <a:r>
+              <a:rPr lang="de-DE" dirty="0"/>
+              <a:t> </a:t>
+            </a:r>
+            <a:r>
+              <a:rPr lang="de-DE" dirty="0" err="1"/>
+              <a:t>Difference</a:t>
+            </a:r>
+            <a:endParaRPr lang="de-DE" dirty="0"/>
+          </a:p>
+        </p:txBody>
+      </p:sp>
+      <p:graphicFrame>
+        <p:nvGraphicFramePr>
+          <p:cNvPr id="10" name="Inhaltsplatzhalter 9">
+            <a:extLst>
+              <a:ext uri="{FF2B5EF4-FFF2-40B4-BE49-F238E27FC236}">
+                <a16:creationId xmlns:a16="http://schemas.microsoft.com/office/drawing/2014/main" id="{8E1C3A07-4CD5-8E72-F088-D56EA3DA377A}"/>
+              </a:ext>
+            </a:extLst>
+          </p:cNvPr>
+          <p:cNvGraphicFramePr>
+            <a:graphicFrameLocks noGrp="1"/>
+          </p:cNvGraphicFramePr>
+          <p:nvPr>
+            <p:ph sz="half" idx="1"/>
+            <p:extLst>
+              <p:ext uri="{D42A27DB-BD31-4B8C-83A1-F6EECF244321}">
+                <p14:modId xmlns:p14="http://schemas.microsoft.com/office/powerpoint/2010/main" val="2876121677"/>
+              </p:ext>
+            </p:extLst>
+          </p:nvPr>
+        </p:nvGraphicFramePr>
+        <p:xfrm>
+          <a:off x="838200" y="2230380"/>
+          <a:ext cx="5181600" cy="2397240"/>
+        </p:xfrm>
+        <a:graphic>
+          <a:graphicData uri="http://schemas.openxmlformats.org/drawingml/2006/chart">
+            <c:chart xmlns:c="http://schemas.openxmlformats.org/drawingml/2006/chart" xmlns:r="http://schemas.openxmlformats.org/officeDocument/2006/relationships" r:id="rId2"/>
+          </a:graphicData>
+        </a:graphic>
+      </p:graphicFrame>
+      <p:pic>
+        <p:nvPicPr>
+          <p:cNvPr id="7" name="Inhaltsplatzhalter 6">
+            <a:extLst>
+              <a:ext uri="{FF2B5EF4-FFF2-40B4-BE49-F238E27FC236}">
+                <a16:creationId xmlns:a16="http://schemas.microsoft.com/office/drawing/2014/main" id="{88B9ABD2-03FF-7E82-5E77-9D785248D030}"/>
+              </a:ext>
+            </a:extLst>
+          </p:cNvPr>
+          <p:cNvPicPr>
+            <a:picLocks noGrp="1" noChangeAspect="1"/>
+          </p:cNvPicPr>
+          <p:nvPr>
+            <p:ph sz="half" idx="2"/>
+          </p:nvPr>
+        </p:nvPicPr>
+        <p:blipFill>
+          <a:blip r:embed="rId3"/>
+          <a:stretch>
+            <a:fillRect/>
+          </a:stretch>
+        </p:blipFill>
+        <p:spPr>
+          <a:xfrm>
+            <a:off x="6096000" y="2183072"/>
+            <a:ext cx="5181600" cy="2586423"/>
+          </a:xfrm>
+        </p:spPr>
+      </p:pic>
+      <p:sp>
+        <p:nvSpPr>
+          <p:cNvPr id="11" name="Textfeld 10">
+            <a:extLst>
+              <a:ext uri="{FF2B5EF4-FFF2-40B4-BE49-F238E27FC236}">
+                <a16:creationId xmlns:a16="http://schemas.microsoft.com/office/drawing/2014/main" id="{55E7B91A-4E8C-F06D-D7F6-F09F66B91EF0}"/>
+              </a:ext>
+            </a:extLst>
+          </p:cNvPr>
+          <p:cNvSpPr txBox="1"/>
+          <p:nvPr/>
+        </p:nvSpPr>
+        <p:spPr>
+          <a:xfrm>
+            <a:off x="838200" y="1773512"/>
+            <a:ext cx="5181600" cy="369332"/>
+          </a:xfrm>
+          <a:prstGeom prst="rect">
+            <a:avLst/>
+          </a:prstGeom>
+          <a:noFill/>
+        </p:spPr>
+        <p:txBody>
+          <a:bodyPr wrap="square" rtlCol="0">
+            <a:spAutoFit/>
+          </a:bodyPr>
+          <a:lstStyle/>
+          <a:p>
+            <a:r>
+              <a:rPr lang="de-DE" dirty="0"/>
+              <a:t>Average </a:t>
+            </a:r>
+            <a:r>
+              <a:rPr lang="de-DE" dirty="0" err="1"/>
+              <a:t>of</a:t>
+            </a:r>
+            <a:r>
+              <a:rPr lang="de-DE" dirty="0"/>
+              <a:t> 95,9% (2877 </a:t>
+            </a:r>
+            <a:r>
+              <a:rPr lang="de-DE" dirty="0" err="1"/>
+              <a:t>of</a:t>
+            </a:r>
+            <a:r>
+              <a:rPr lang="de-DE" dirty="0"/>
+              <a:t> 3000)</a:t>
+            </a:r>
+          </a:p>
+        </p:txBody>
+      </p:sp>
+      <p:sp>
+        <p:nvSpPr>
+          <p:cNvPr id="12" name="Textfeld 11">
+            <a:extLst>
+              <a:ext uri="{FF2B5EF4-FFF2-40B4-BE49-F238E27FC236}">
+                <a16:creationId xmlns:a16="http://schemas.microsoft.com/office/drawing/2014/main" id="{623727A0-7029-D053-EEDE-0EF0E2C57378}"/>
+              </a:ext>
+            </a:extLst>
+          </p:cNvPr>
+          <p:cNvSpPr txBox="1"/>
+          <p:nvPr/>
+        </p:nvSpPr>
+        <p:spPr>
+          <a:xfrm>
+            <a:off x="6352309" y="1752214"/>
+            <a:ext cx="4925291" cy="369332"/>
+          </a:xfrm>
+          <a:prstGeom prst="rect">
+            <a:avLst/>
+          </a:prstGeom>
+          <a:noFill/>
+        </p:spPr>
+        <p:txBody>
+          <a:bodyPr wrap="square" rtlCol="0">
+            <a:spAutoFit/>
+          </a:bodyPr>
+          <a:lstStyle/>
+          <a:p>
+            <a:r>
+              <a:rPr lang="de-DE" dirty="0"/>
+              <a:t>Average </a:t>
+            </a:r>
+            <a:r>
+              <a:rPr lang="de-DE" dirty="0" err="1"/>
+              <a:t>of</a:t>
+            </a:r>
+            <a:r>
+              <a:rPr lang="de-DE" dirty="0"/>
+              <a:t> 96% (7230 </a:t>
+            </a:r>
+            <a:r>
+              <a:rPr lang="de-DE" dirty="0" err="1"/>
+              <a:t>of</a:t>
+            </a:r>
+            <a:r>
+              <a:rPr lang="de-DE" dirty="0"/>
+              <a:t> 7500)</a:t>
+            </a:r>
+          </a:p>
+        </p:txBody>
+      </p:sp>
+      <p:sp>
+        <p:nvSpPr>
+          <p:cNvPr id="13" name="Textfeld 12">
+            <a:extLst>
+              <a:ext uri="{FF2B5EF4-FFF2-40B4-BE49-F238E27FC236}">
+                <a16:creationId xmlns:a16="http://schemas.microsoft.com/office/drawing/2014/main" id="{CC9A7BA6-C6C0-7840-B71B-459F32DD397A}"/>
+              </a:ext>
+            </a:extLst>
+          </p:cNvPr>
+          <p:cNvSpPr txBox="1"/>
+          <p:nvPr/>
+        </p:nvSpPr>
+        <p:spPr>
+          <a:xfrm>
+            <a:off x="876993" y="1397736"/>
+            <a:ext cx="4904509" cy="369332"/>
+          </a:xfrm>
+          <a:prstGeom prst="rect">
+            <a:avLst/>
+          </a:prstGeom>
+          <a:noFill/>
+        </p:spPr>
+        <p:txBody>
+          <a:bodyPr wrap="square" rtlCol="0">
+            <a:spAutoFit/>
+          </a:bodyPr>
+          <a:lstStyle/>
+          <a:p>
+            <a:r>
+              <a:rPr lang="de-DE" b="1" dirty="0"/>
+              <a:t>Replizierte Werte	</a:t>
+            </a:r>
+          </a:p>
+        </p:txBody>
+      </p:sp>
+      <p:sp>
+        <p:nvSpPr>
+          <p:cNvPr id="15" name="Textfeld 14">
+            <a:extLst>
+              <a:ext uri="{FF2B5EF4-FFF2-40B4-BE49-F238E27FC236}">
+                <a16:creationId xmlns:a16="http://schemas.microsoft.com/office/drawing/2014/main" id="{B9961A0D-8066-40BE-B4C5-C1644FF5B478}"/>
+              </a:ext>
+            </a:extLst>
+          </p:cNvPr>
+          <p:cNvSpPr txBox="1"/>
+          <p:nvPr/>
+        </p:nvSpPr>
+        <p:spPr>
+          <a:xfrm>
+            <a:off x="6352309" y="1397736"/>
+            <a:ext cx="5105400" cy="369332"/>
+          </a:xfrm>
+          <a:prstGeom prst="rect">
+            <a:avLst/>
+          </a:prstGeom>
+          <a:noFill/>
+        </p:spPr>
+        <p:txBody>
+          <a:bodyPr wrap="square" rtlCol="0">
+            <a:spAutoFit/>
+          </a:bodyPr>
+          <a:lstStyle/>
+          <a:p>
+            <a:r>
+              <a:rPr lang="de-DE" b="1" dirty="0"/>
+              <a:t>Werte aus Paper</a:t>
+            </a:r>
+          </a:p>
+        </p:txBody>
+      </p:sp>
+      <p:sp>
+        <p:nvSpPr>
+          <p:cNvPr id="16" name="Textfeld 15">
+            <a:extLst>
+              <a:ext uri="{FF2B5EF4-FFF2-40B4-BE49-F238E27FC236}">
+                <a16:creationId xmlns:a16="http://schemas.microsoft.com/office/drawing/2014/main" id="{96D54F9E-873C-FFDA-5F42-32C2F4C5C992}"/>
+              </a:ext>
+            </a:extLst>
+          </p:cNvPr>
+          <p:cNvSpPr txBox="1"/>
+          <p:nvPr/>
+        </p:nvSpPr>
+        <p:spPr>
+          <a:xfrm>
+            <a:off x="798022" y="4769495"/>
+            <a:ext cx="5181600" cy="1200329"/>
+          </a:xfrm>
+          <a:prstGeom prst="rect">
+            <a:avLst/>
+          </a:prstGeom>
+          <a:noFill/>
+        </p:spPr>
+        <p:txBody>
+          <a:bodyPr wrap="square" rtlCol="0">
+            <a:spAutoFit/>
+          </a:bodyPr>
+          <a:lstStyle/>
+          <a:p>
+            <a:r>
+              <a:rPr lang="de-DE" dirty="0" err="1"/>
+              <a:t>Percent</a:t>
+            </a:r>
+            <a:r>
+              <a:rPr lang="de-DE" dirty="0"/>
+              <a:t> </a:t>
+            </a:r>
+            <a:r>
+              <a:rPr lang="de-DE" dirty="0" err="1"/>
+              <a:t>differences</a:t>
+            </a:r>
+            <a:r>
+              <a:rPr lang="de-DE" dirty="0"/>
+              <a:t> </a:t>
+            </a:r>
+            <a:r>
+              <a:rPr lang="de-DE" dirty="0" err="1"/>
+              <a:t>of</a:t>
+            </a:r>
+            <a:r>
+              <a:rPr lang="de-DE" dirty="0"/>
+              <a:t> e-</a:t>
+            </a:r>
+            <a:r>
+              <a:rPr lang="de-DE" dirty="0" err="1"/>
+              <a:t>fold</a:t>
+            </a:r>
+            <a:r>
+              <a:rPr lang="de-DE" dirty="0"/>
+              <a:t> </a:t>
+            </a:r>
+            <a:r>
+              <a:rPr lang="de-DE" dirty="0" err="1"/>
+              <a:t>to</a:t>
+            </a:r>
+            <a:r>
+              <a:rPr lang="de-DE" dirty="0"/>
+              <a:t> k-</a:t>
+            </a:r>
+            <a:r>
+              <a:rPr lang="de-DE" dirty="0" err="1"/>
+              <a:t>fold</a:t>
+            </a:r>
+            <a:r>
+              <a:rPr lang="de-DE" dirty="0"/>
+              <a:t> on </a:t>
+            </a:r>
+            <a:r>
+              <a:rPr lang="de-DE" dirty="0" err="1"/>
+              <a:t>average</a:t>
+            </a:r>
+            <a:endParaRPr lang="de-DE" dirty="0"/>
+          </a:p>
+          <a:p>
+            <a:endParaRPr lang="de-DE" dirty="0"/>
+          </a:p>
+          <a:p>
+            <a:r>
+              <a:rPr lang="de-DE" dirty="0"/>
+              <a:t>Classification: 0,99%</a:t>
+            </a:r>
+          </a:p>
+          <a:p>
+            <a:r>
+              <a:rPr lang="de-DE" dirty="0"/>
+              <a:t>Regression: 1,40%</a:t>
+            </a:r>
+          </a:p>
+        </p:txBody>
+      </p:sp>
+      <p:sp>
+        <p:nvSpPr>
+          <p:cNvPr id="17" name="Textfeld 16">
+            <a:extLst>
+              <a:ext uri="{FF2B5EF4-FFF2-40B4-BE49-F238E27FC236}">
+                <a16:creationId xmlns:a16="http://schemas.microsoft.com/office/drawing/2014/main" id="{0D9479C5-C901-C850-6D2D-69E4A1E8AEF3}"/>
+              </a:ext>
+            </a:extLst>
+          </p:cNvPr>
+          <p:cNvSpPr txBox="1"/>
+          <p:nvPr/>
+        </p:nvSpPr>
+        <p:spPr>
+          <a:xfrm>
+            <a:off x="6352309" y="4804756"/>
+            <a:ext cx="5105400" cy="1723549"/>
+          </a:xfrm>
+          <a:prstGeom prst="rect">
+            <a:avLst/>
+          </a:prstGeom>
+          <a:noFill/>
+        </p:spPr>
+        <p:txBody>
+          <a:bodyPr wrap="square" rtlCol="0">
+            <a:spAutoFit/>
+          </a:bodyPr>
+          <a:lstStyle/>
+          <a:p>
+            <a:r>
+              <a:rPr lang="de-DE" dirty="0" err="1"/>
+              <a:t>Percent</a:t>
+            </a:r>
+            <a:r>
+              <a:rPr lang="de-DE" dirty="0"/>
+              <a:t> </a:t>
+            </a:r>
+            <a:r>
+              <a:rPr lang="de-DE" dirty="0" err="1"/>
+              <a:t>differences</a:t>
+            </a:r>
+            <a:r>
+              <a:rPr lang="de-DE" dirty="0"/>
+              <a:t> </a:t>
+            </a:r>
+            <a:r>
+              <a:rPr lang="de-DE" dirty="0" err="1"/>
+              <a:t>of</a:t>
+            </a:r>
+            <a:r>
+              <a:rPr lang="de-DE" dirty="0"/>
+              <a:t> e-</a:t>
+            </a:r>
+            <a:r>
+              <a:rPr lang="de-DE" dirty="0" err="1"/>
+              <a:t>fold</a:t>
+            </a:r>
+            <a:r>
+              <a:rPr lang="de-DE" dirty="0"/>
+              <a:t> </a:t>
+            </a:r>
+            <a:r>
+              <a:rPr lang="de-DE" dirty="0" err="1"/>
+              <a:t>to</a:t>
+            </a:r>
+            <a:r>
+              <a:rPr lang="de-DE" dirty="0"/>
+              <a:t> k-</a:t>
+            </a:r>
+            <a:r>
+              <a:rPr lang="de-DE" dirty="0" err="1"/>
+              <a:t>fold</a:t>
+            </a:r>
+            <a:r>
+              <a:rPr lang="de-DE" dirty="0"/>
+              <a:t> on </a:t>
+            </a:r>
+            <a:r>
+              <a:rPr lang="de-DE" dirty="0" err="1"/>
+              <a:t>average</a:t>
+            </a:r>
+            <a:endParaRPr lang="de-DE" dirty="0"/>
+          </a:p>
+          <a:p>
+            <a:endParaRPr lang="de-DE" dirty="0"/>
+          </a:p>
+          <a:p>
+            <a:r>
+              <a:rPr lang="de-DE" dirty="0"/>
+              <a:t>Binary Classification: </a:t>
+            </a:r>
+            <a:r>
+              <a:rPr lang="de-DE" sz="1600" dirty="0"/>
+              <a:t>&lt; 1%, </a:t>
+            </a:r>
+            <a:r>
+              <a:rPr lang="de-DE" sz="1600" dirty="0" err="1"/>
+              <a:t>outliers</a:t>
+            </a:r>
+            <a:r>
+              <a:rPr lang="de-DE" sz="1600" dirty="0"/>
+              <a:t> </a:t>
+            </a:r>
+            <a:r>
+              <a:rPr lang="de-DE" sz="1600" dirty="0" err="1"/>
+              <a:t>up</a:t>
+            </a:r>
+            <a:r>
+              <a:rPr lang="de-DE" sz="1600" dirty="0"/>
+              <a:t> </a:t>
+            </a:r>
+            <a:r>
+              <a:rPr lang="de-DE" sz="1600" dirty="0" err="1"/>
+              <a:t>to</a:t>
+            </a:r>
+            <a:r>
+              <a:rPr lang="de-DE" sz="1600" dirty="0"/>
+              <a:t> 5%</a:t>
+            </a:r>
+          </a:p>
+          <a:p>
+            <a:r>
+              <a:rPr lang="de-DE" dirty="0"/>
+              <a:t>Multi-Class Classification: </a:t>
+            </a:r>
+            <a:r>
+              <a:rPr lang="de-DE" sz="1600" dirty="0"/>
+              <a:t>&lt; 2%, </a:t>
+            </a:r>
+            <a:r>
+              <a:rPr lang="de-DE" sz="1600" dirty="0" err="1"/>
+              <a:t>outliers</a:t>
+            </a:r>
+            <a:r>
+              <a:rPr lang="de-DE" sz="1600" dirty="0"/>
+              <a:t> </a:t>
+            </a:r>
+            <a:r>
+              <a:rPr lang="de-DE" sz="1600" dirty="0" err="1"/>
+              <a:t>up</a:t>
+            </a:r>
+            <a:r>
+              <a:rPr lang="de-DE" sz="1600" dirty="0"/>
+              <a:t> </a:t>
+            </a:r>
+            <a:r>
+              <a:rPr lang="de-DE" sz="1600" dirty="0" err="1"/>
+              <a:t>to</a:t>
+            </a:r>
+            <a:r>
+              <a:rPr lang="de-DE" sz="1600" dirty="0"/>
+              <a:t> 16%</a:t>
+            </a:r>
+            <a:br>
+              <a:rPr lang="de-DE" sz="1600" dirty="0"/>
+            </a:br>
+            <a:r>
+              <a:rPr lang="de-DE" sz="1600" dirty="0"/>
+              <a:t>Regression: &lt; 2%, </a:t>
+            </a:r>
+            <a:r>
+              <a:rPr lang="de-DE" sz="1600" dirty="0" err="1"/>
+              <a:t>outliers</a:t>
+            </a:r>
+            <a:r>
+              <a:rPr lang="de-DE" sz="1600" dirty="0"/>
+              <a:t> </a:t>
+            </a:r>
+            <a:r>
+              <a:rPr lang="de-DE" sz="1600" dirty="0" err="1"/>
+              <a:t>up</a:t>
+            </a:r>
+            <a:r>
+              <a:rPr lang="de-DE" sz="1600" dirty="0"/>
+              <a:t> </a:t>
+            </a:r>
+            <a:r>
+              <a:rPr lang="de-DE" sz="1600" dirty="0" err="1"/>
+              <a:t>to</a:t>
+            </a:r>
+            <a:r>
+              <a:rPr lang="de-DE" sz="1600" dirty="0"/>
+              <a:t> 12%</a:t>
+            </a:r>
+          </a:p>
+          <a:p>
+            <a:endParaRPr lang="de-DE" dirty="0"/>
+          </a:p>
+        </p:txBody>
+      </p:sp>
+      <p:sp>
+        <p:nvSpPr>
+          <p:cNvPr id="18" name="Textfeld 17">
+            <a:extLst>
+              <a:ext uri="{FF2B5EF4-FFF2-40B4-BE49-F238E27FC236}">
+                <a16:creationId xmlns:a16="http://schemas.microsoft.com/office/drawing/2014/main" id="{766CA778-9FDD-7A49-BB16-606E6AF427C4}"/>
+              </a:ext>
+            </a:extLst>
+          </p:cNvPr>
+          <p:cNvSpPr txBox="1"/>
+          <p:nvPr/>
+        </p:nvSpPr>
+        <p:spPr>
+          <a:xfrm>
+            <a:off x="4322618" y="6334298"/>
+            <a:ext cx="3786447" cy="369332"/>
+          </a:xfrm>
+          <a:prstGeom prst="rect">
+            <a:avLst/>
+          </a:prstGeom>
+          <a:noFill/>
+        </p:spPr>
+        <p:txBody>
+          <a:bodyPr wrap="square" rtlCol="0">
+            <a:spAutoFit/>
+          </a:bodyPr>
+          <a:lstStyle/>
+          <a:p>
+            <a:r>
+              <a:rPr lang="de-DE" dirty="0" err="1"/>
+              <a:t>Results</a:t>
+            </a:r>
+            <a:r>
+              <a:rPr lang="de-DE" dirty="0"/>
+              <a:t> </a:t>
+            </a:r>
+            <a:r>
+              <a:rPr lang="de-DE" dirty="0" err="1"/>
+              <a:t>of</a:t>
+            </a:r>
+            <a:r>
+              <a:rPr lang="de-DE" dirty="0"/>
+              <a:t> </a:t>
+            </a:r>
+            <a:r>
+              <a:rPr lang="de-DE" dirty="0" err="1"/>
+              <a:t>iterations</a:t>
+            </a:r>
+            <a:r>
+              <a:rPr lang="de-DE" dirty="0"/>
+              <a:t> </a:t>
+            </a:r>
+            <a:r>
+              <a:rPr lang="de-DE" dirty="0" err="1"/>
+              <a:t>where</a:t>
+            </a:r>
+            <a:r>
+              <a:rPr lang="de-DE" dirty="0"/>
+              <a:t> e &lt; 10</a:t>
+            </a:r>
+          </a:p>
+        </p:txBody>
+      </p:sp>
+    </p:spTree>
+    <p:extLst>
+      <p:ext uri="{BB962C8B-B14F-4D97-AF65-F5344CB8AC3E}">
+        <p14:creationId xmlns:p14="http://schemas.microsoft.com/office/powerpoint/2010/main" val="2489396028"/>
+      </p:ext>
+    </p:extLst>
+  </p:cSld>
+  <p:clrMapOvr>
+    <a:masterClrMapping/>
+  </p:clrMapOvr>
+</p:sld>
+</file>
+
+<file path=ppt/slides/slide5.xml><?xml version="1.0" encoding="utf-8"?>
+<p:sld xmlns:a="http://schemas.openxmlformats.org/drawingml/2006/main" xmlns:r="http://schemas.openxmlformats.org/officeDocument/2006/relationships" xmlns:p="http://schemas.openxmlformats.org/presentationml/2006/main">
+  <p:cSld>
+    <p:spTree>
+      <p:nvGrpSpPr>
+        <p:cNvPr id="1" name="">
+          <a:extLst>
+            <a:ext uri="{FF2B5EF4-FFF2-40B4-BE49-F238E27FC236}">
+              <a16:creationId xmlns:a16="http://schemas.microsoft.com/office/drawing/2014/main" id="{DDC06559-C557-15D5-52CF-1512336E82F3}"/>
+            </a:ext>
+          </a:extLst>
+        </p:cNvPr>
+        <p:cNvGrpSpPr/>
+        <p:nvPr/>
+      </p:nvGrpSpPr>
+      <p:grpSpPr>
+        <a:xfrm>
+          <a:off x="0" y="0"/>
+          <a:ext cx="0" cy="0"/>
+          <a:chOff x="0" y="0"/>
+          <a:chExt cx="0" cy="0"/>
+        </a:xfrm>
+      </p:grpSpPr>
+      <p:sp>
+        <p:nvSpPr>
+          <p:cNvPr id="2" name="Titel 1">
+            <a:extLst>
+              <a:ext uri="{FF2B5EF4-FFF2-40B4-BE49-F238E27FC236}">
+                <a16:creationId xmlns:a16="http://schemas.microsoft.com/office/drawing/2014/main" id="{B9D225E0-C1BC-B950-B4FD-96D05F8BD998}"/>
+              </a:ext>
+            </a:extLst>
+          </p:cNvPr>
+          <p:cNvSpPr>
+            <a:spLocks noGrp="1"/>
+          </p:cNvSpPr>
+          <p:nvPr>
+            <p:ph type="title"/>
+          </p:nvPr>
+        </p:nvSpPr>
+        <p:spPr/>
+        <p:txBody>
+          <a:bodyPr/>
+          <a:lstStyle/>
+          <a:p>
+            <a:r>
+              <a:rPr lang="de-DE" dirty="0" err="1"/>
+              <a:t>Github</a:t>
+            </a:r>
+            <a:r>
+              <a:rPr lang="de-DE" dirty="0"/>
+              <a:t> </a:t>
+            </a:r>
+            <a:r>
+              <a:rPr lang="de-DE" dirty="0" err="1"/>
+              <a:t>Commits</a:t>
+            </a:r>
+            <a:endParaRPr lang="de-DE" dirty="0"/>
+          </a:p>
+        </p:txBody>
+      </p:sp>
+      <p:sp>
+        <p:nvSpPr>
+          <p:cNvPr id="3" name="Inhaltsplatzhalter 2">
+            <a:extLst>
+              <a:ext uri="{FF2B5EF4-FFF2-40B4-BE49-F238E27FC236}">
+                <a16:creationId xmlns:a16="http://schemas.microsoft.com/office/drawing/2014/main" id="{5FCDD6F4-5438-6393-F640-CB0877CDDD48}"/>
+              </a:ext>
+            </a:extLst>
+          </p:cNvPr>
+          <p:cNvSpPr>
+            <a:spLocks noGrp="1"/>
+          </p:cNvSpPr>
+          <p:nvPr>
+            <p:ph idx="1"/>
+          </p:nvPr>
+        </p:nvSpPr>
+        <p:spPr/>
+        <p:txBody>
+          <a:bodyPr/>
+          <a:lstStyle/>
+          <a:p>
+            <a:endParaRPr lang="de-DE"/>
+          </a:p>
+        </p:txBody>
+      </p:sp>
+    </p:spTree>
+    <p:extLst>
+      <p:ext uri="{BB962C8B-B14F-4D97-AF65-F5344CB8AC3E}">
+        <p14:creationId xmlns:p14="http://schemas.microsoft.com/office/powerpoint/2010/main" val="1511336213"/>
+      </p:ext>
+    </p:extLst>
+  </p:cSld>
+  <p:clrMapOvr>
+    <a:masterClrMapping/>
+  </p:clrMapOvr>
+</p:sld>
+</file>
+
+<file path=ppt/slides/slide6.xml><?xml version="1.0" encoding="utf-8"?>
+<p:sld xmlns:a="http://schemas.openxmlformats.org/drawingml/2006/main" xmlns:r="http://schemas.openxmlformats.org/officeDocument/2006/relationships" xmlns:p="http://schemas.openxmlformats.org/presentationml/2006/main">
+  <p:cSld>
+    <p:spTree>
+      <p:nvGrpSpPr>
+        <p:cNvPr id="1" name="">
+          <a:extLst>
+            <a:ext uri="{FF2B5EF4-FFF2-40B4-BE49-F238E27FC236}">
+              <a16:creationId xmlns:a16="http://schemas.microsoft.com/office/drawing/2014/main" id="{7041D394-E0DA-5DB9-001D-2E5191F9C886}"/>
+            </a:ext>
+          </a:extLst>
+        </p:cNvPr>
+        <p:cNvGrpSpPr/>
+        <p:nvPr/>
+      </p:nvGrpSpPr>
+      <p:grpSpPr>
+        <a:xfrm>
+          <a:off x="0" y="0"/>
+          <a:ext cx="0" cy="0"/>
+          <a:chOff x="0" y="0"/>
+          <a:chExt cx="0" cy="0"/>
+        </a:xfrm>
+      </p:grpSpPr>
+      <p:sp>
+        <p:nvSpPr>
+          <p:cNvPr id="2" name="Titel 1">
+            <a:extLst>
+              <a:ext uri="{FF2B5EF4-FFF2-40B4-BE49-F238E27FC236}">
+                <a16:creationId xmlns:a16="http://schemas.microsoft.com/office/drawing/2014/main" id="{A86EA44D-DB63-B11A-C676-B836DE910E7A}"/>
+              </a:ext>
+            </a:extLst>
+          </p:cNvPr>
+          <p:cNvSpPr>
+            <a:spLocks noGrp="1"/>
+          </p:cNvSpPr>
+          <p:nvPr>
+            <p:ph type="title"/>
+          </p:nvPr>
+        </p:nvSpPr>
+        <p:spPr/>
+        <p:txBody>
+          <a:bodyPr/>
+          <a:lstStyle/>
+          <a:p>
+            <a:endParaRPr lang="de-DE"/>
+          </a:p>
+        </p:txBody>
+      </p:sp>
+      <p:sp>
+        <p:nvSpPr>
+          <p:cNvPr id="3" name="Inhaltsplatzhalter 2">
+            <a:extLst>
+              <a:ext uri="{FF2B5EF4-FFF2-40B4-BE49-F238E27FC236}">
+                <a16:creationId xmlns:a16="http://schemas.microsoft.com/office/drawing/2014/main" id="{7D892FEC-A24C-E70E-7A4E-6B5ED09968BF}"/>
+              </a:ext>
+            </a:extLst>
+          </p:cNvPr>
+          <p:cNvSpPr>
+            <a:spLocks noGrp="1"/>
+          </p:cNvSpPr>
+          <p:nvPr>
+            <p:ph idx="1"/>
+          </p:nvPr>
+        </p:nvSpPr>
+        <p:spPr/>
+        <p:txBody>
+          <a:bodyPr/>
+          <a:lstStyle/>
+          <a:p>
+            <a:endParaRPr lang="de-DE" dirty="0"/>
+          </a:p>
+        </p:txBody>
+      </p:sp>
+    </p:spTree>
+    <p:extLst>
+      <p:ext uri="{BB962C8B-B14F-4D97-AF65-F5344CB8AC3E}">
+        <p14:creationId xmlns:p14="http://schemas.microsoft.com/office/powerpoint/2010/main" val="1534723374"/>
       </p:ext>
     </p:extLst>
   </p:cSld>

</xml_diff>